<commit_message>
small updates to Week 7 lab after class edits
</commit_message>
<xml_diff>
--- a/Week 7 -- spatiotemporal models/Lab/Lab 7 -- spatial-Gompertz model.pptx
+++ b/Week 7 -- spatiotemporal models/Lab/Lab 7 -- spatial-Gompertz model.pptx
@@ -5,7 +5,7 @@
     <p:sldMasterId id="2147483672" r:id="rId1"/>
   </p:sldMasterIdLst>
   <p:notesMasterIdLst>
-    <p:notesMasterId r:id="rId15"/>
+    <p:notesMasterId r:id="rId17"/>
   </p:notesMasterIdLst>
   <p:sldIdLst>
     <p:sldId id="266" r:id="rId2"/>
@@ -17,10 +17,12 @@
     <p:sldId id="278" r:id="rId8"/>
     <p:sldId id="287" r:id="rId9"/>
     <p:sldId id="275" r:id="rId10"/>
-    <p:sldId id="276" r:id="rId11"/>
-    <p:sldId id="288" r:id="rId12"/>
-    <p:sldId id="283" r:id="rId13"/>
-    <p:sldId id="279" r:id="rId14"/>
+    <p:sldId id="290" r:id="rId11"/>
+    <p:sldId id="276" r:id="rId12"/>
+    <p:sldId id="288" r:id="rId13"/>
+    <p:sldId id="289" r:id="rId14"/>
+    <p:sldId id="283" r:id="rId15"/>
+    <p:sldId id="279" r:id="rId16"/>
   </p:sldIdLst>
   <p:sldSz cx="9144000" cy="6858000" type="screen4x3"/>
   <p:notesSz cx="6858000" cy="9144000"/>
@@ -3593,6 +3595,1436 @@
                   <a:buNone/>
                 </a:pPr>
                 <a:r>
+                  <a:rPr lang="en-US" sz="2000" b="1" dirty="0" smtClean="0"/>
+                  <a:t>Spatial Gompertz model (another way of writing)</a:t>
+                </a:r>
+                <a:r>
+                  <a:rPr lang="en-US" sz="2000" dirty="0" smtClean="0"/>
+                  <a:t>:</a:t>
+                </a:r>
+                <a:endParaRPr lang="en-US" sz="2000" dirty="0" smtClean="0"/>
+              </a:p>
+              <a:p>
+                <a:pPr lvl="1"/>
+                <a:r>
+                  <a:rPr lang="en-US" sz="1800" dirty="0" smtClean="0"/>
+                  <a:t>Can use same trick as “Gompertz model version #3”</a:t>
+                </a:r>
+              </a:p>
+              <a:p>
+                <a:pPr marL="0" indent="0">
+                  <a:buNone/>
+                </a:pPr>
+                <a14:m>
+                  <m:oMathPara xmlns:m="http://schemas.openxmlformats.org/officeDocument/2006/math">
+                    <m:oMathParaPr>
+                      <m:jc m:val="centerGroup"/>
+                    </m:oMathParaPr>
+                    <m:oMath xmlns:m="http://schemas.openxmlformats.org/officeDocument/2006/math">
+                      <m:sSub>
+                        <m:sSubPr>
+                          <m:ctrlPr>
+                            <a:rPr lang="en-US" sz="2000" i="1">
+                              <a:latin typeface="Cambria Math" panose="02040503050406030204" pitchFamily="18" charset="0"/>
+                            </a:rPr>
+                          </m:ctrlPr>
+                        </m:sSubPr>
+                        <m:e>
+                          <m:r>
+                            <a:rPr lang="en-US" sz="2000" i="1">
+                              <a:latin typeface="Cambria Math" panose="02040503050406030204" pitchFamily="18" charset="0"/>
+                            </a:rPr>
+                            <m:t>𝑐</m:t>
+                          </m:r>
+                        </m:e>
+                        <m:sub>
+                          <m:r>
+                            <a:rPr lang="en-US" sz="2000" i="1">
+                              <a:latin typeface="Cambria Math" panose="02040503050406030204" pitchFamily="18" charset="0"/>
+                            </a:rPr>
+                            <m:t>𝑖</m:t>
+                          </m:r>
+                        </m:sub>
+                      </m:sSub>
+                      <m:r>
+                        <a:rPr lang="en-US" sz="2000" i="1">
+                          <a:latin typeface="Cambria Math" panose="02040503050406030204" pitchFamily="18" charset="0"/>
+                        </a:rPr>
+                        <m:t>~</m:t>
+                      </m:r>
+                      <m:r>
+                        <m:rPr>
+                          <m:sty m:val="p"/>
+                        </m:rPr>
+                        <a:rPr lang="en-US" sz="2000">
+                          <a:latin typeface="Cambria Math" panose="02040503050406030204" pitchFamily="18" charset="0"/>
+                        </a:rPr>
+                        <m:t>Poisson</m:t>
+                      </m:r>
+                      <m:r>
+                        <a:rPr lang="en-US" sz="2000" i="1">
+                          <a:latin typeface="Cambria Math" panose="02040503050406030204" pitchFamily="18" charset="0"/>
+                        </a:rPr>
+                        <m:t>(</m:t>
+                      </m:r>
+                      <m:r>
+                        <m:rPr>
+                          <m:sty m:val="p"/>
+                        </m:rPr>
+                        <a:rPr lang="en-US" sz="2000">
+                          <a:latin typeface="Cambria Math" panose="02040503050406030204" pitchFamily="18" charset="0"/>
+                        </a:rPr>
+                        <m:t>exp</m:t>
+                      </m:r>
+                      <m:r>
+                        <a:rPr lang="en-US" sz="2000" i="1">
+                          <a:latin typeface="Cambria Math" panose="02040503050406030204" pitchFamily="18" charset="0"/>
+                        </a:rPr>
+                        <m:t>⁡(</m:t>
+                      </m:r>
+                      <m:r>
+                        <a:rPr lang="en-US" sz="2000" i="1">
+                          <a:latin typeface="Cambria Math" panose="02040503050406030204" pitchFamily="18" charset="0"/>
+                          <a:ea typeface="Cambria Math" panose="02040503050406030204" pitchFamily="18" charset="0"/>
+                        </a:rPr>
+                        <m:t>𝑑</m:t>
+                      </m:r>
+                      <m:r>
+                        <a:rPr lang="en-US" sz="2000" i="1">
+                          <a:latin typeface="Cambria Math" panose="02040503050406030204" pitchFamily="18" charset="0"/>
+                          <a:ea typeface="Cambria Math" panose="02040503050406030204" pitchFamily="18" charset="0"/>
+                        </a:rPr>
+                        <m:t>(</m:t>
+                      </m:r>
+                      <m:sSub>
+                        <m:sSubPr>
+                          <m:ctrlPr>
+                            <a:rPr lang="en-US" sz="2000" i="1">
+                              <a:latin typeface="Cambria Math" panose="02040503050406030204" pitchFamily="18" charset="0"/>
+                              <a:ea typeface="Cambria Math" panose="02040503050406030204" pitchFamily="18" charset="0"/>
+                            </a:rPr>
+                          </m:ctrlPr>
+                        </m:sSubPr>
+                        <m:e>
+                          <m:r>
+                            <a:rPr lang="en-US" sz="2000" i="1">
+                              <a:latin typeface="Cambria Math" panose="02040503050406030204" pitchFamily="18" charset="0"/>
+                              <a:ea typeface="Cambria Math" panose="02040503050406030204" pitchFamily="18" charset="0"/>
+                            </a:rPr>
+                            <m:t>𝑠</m:t>
+                          </m:r>
+                        </m:e>
+                        <m:sub>
+                          <m:r>
+                            <a:rPr lang="en-US" sz="2000" i="1">
+                              <a:latin typeface="Cambria Math" panose="02040503050406030204" pitchFamily="18" charset="0"/>
+                              <a:ea typeface="Cambria Math" panose="02040503050406030204" pitchFamily="18" charset="0"/>
+                            </a:rPr>
+                            <m:t>𝑖</m:t>
+                          </m:r>
+                        </m:sub>
+                      </m:sSub>
+                      <m:r>
+                        <a:rPr lang="en-US" sz="2000" b="0" i="1" smtClean="0">
+                          <a:latin typeface="Cambria Math" panose="02040503050406030204" pitchFamily="18" charset="0"/>
+                          <a:ea typeface="Cambria Math" panose="02040503050406030204" pitchFamily="18" charset="0"/>
+                        </a:rPr>
+                        <m:t>,</m:t>
+                      </m:r>
+                      <m:sSub>
+                        <m:sSubPr>
+                          <m:ctrlPr>
+                            <a:rPr lang="en-US" sz="2000" b="0" i="1" smtClean="0">
+                              <a:latin typeface="Cambria Math" panose="02040503050406030204" pitchFamily="18" charset="0"/>
+                              <a:ea typeface="Cambria Math" panose="02040503050406030204" pitchFamily="18" charset="0"/>
+                            </a:rPr>
+                          </m:ctrlPr>
+                        </m:sSubPr>
+                        <m:e>
+                          <m:r>
+                            <a:rPr lang="en-US" sz="2000" b="0" i="1" smtClean="0">
+                              <a:latin typeface="Cambria Math" panose="02040503050406030204" pitchFamily="18" charset="0"/>
+                              <a:ea typeface="Cambria Math" panose="02040503050406030204" pitchFamily="18" charset="0"/>
+                            </a:rPr>
+                            <m:t>𝑡</m:t>
+                          </m:r>
+                        </m:e>
+                        <m:sub>
+                          <m:r>
+                            <a:rPr lang="en-US" sz="2000" b="0" i="1" smtClean="0">
+                              <a:latin typeface="Cambria Math" panose="02040503050406030204" pitchFamily="18" charset="0"/>
+                              <a:ea typeface="Cambria Math" panose="02040503050406030204" pitchFamily="18" charset="0"/>
+                            </a:rPr>
+                            <m:t>𝑖</m:t>
+                          </m:r>
+                        </m:sub>
+                      </m:sSub>
+                      <m:r>
+                        <a:rPr lang="en-US" sz="2000" i="1">
+                          <a:latin typeface="Cambria Math" panose="02040503050406030204" pitchFamily="18" charset="0"/>
+                          <a:ea typeface="Cambria Math" panose="02040503050406030204" pitchFamily="18" charset="0"/>
+                        </a:rPr>
+                        <m:t>)))</m:t>
+                      </m:r>
+                    </m:oMath>
+                  </m:oMathPara>
+                </a14:m>
+                <a:endParaRPr lang="en-GB" sz="2000" dirty="0"/>
+              </a:p>
+              <a:p>
+                <a:pPr marL="0" indent="0">
+                  <a:buNone/>
+                </a:pPr>
+                <a14:m>
+                  <m:oMathPara xmlns:m="http://schemas.openxmlformats.org/officeDocument/2006/math">
+                    <m:oMathParaPr>
+                      <m:jc m:val="centerGroup"/>
+                    </m:oMathParaPr>
+                    <m:oMath xmlns:m="http://schemas.openxmlformats.org/officeDocument/2006/math">
+                      <m:sSub>
+                        <m:sSubPr>
+                          <m:ctrlPr>
+                            <a:rPr lang="en-US" sz="2000" b="0" i="1" smtClean="0">
+                              <a:latin typeface="Cambria Math" panose="02040503050406030204" pitchFamily="18" charset="0"/>
+                              <a:ea typeface="Cambria Math" panose="02040503050406030204" pitchFamily="18" charset="0"/>
+                            </a:rPr>
+                          </m:ctrlPr>
+                        </m:sSubPr>
+                        <m:e>
+                          <m:r>
+                            <a:rPr lang="en-US" sz="2000" b="1" i="0">
+                              <a:latin typeface="Cambria Math" panose="02040503050406030204" pitchFamily="18" charset="0"/>
+                              <a:ea typeface="Cambria Math" panose="02040503050406030204" pitchFamily="18" charset="0"/>
+                            </a:rPr>
+                            <m:t>𝐝</m:t>
+                          </m:r>
+                        </m:e>
+                        <m:sub>
+                          <m:r>
+                            <a:rPr lang="en-US" sz="2000" b="0" i="1" smtClean="0">
+                              <a:latin typeface="Cambria Math" panose="02040503050406030204" pitchFamily="18" charset="0"/>
+                              <a:ea typeface="Cambria Math" panose="02040503050406030204" pitchFamily="18" charset="0"/>
+                            </a:rPr>
+                            <m:t>𝑡</m:t>
+                          </m:r>
+                        </m:sub>
+                      </m:sSub>
+                      <m:r>
+                        <a:rPr lang="en-US" sz="2000" b="0" i="1" smtClean="0">
+                          <a:latin typeface="Cambria Math" panose="02040503050406030204" pitchFamily="18" charset="0"/>
+                          <a:ea typeface="Cambria Math" panose="02040503050406030204" pitchFamily="18" charset="0"/>
+                        </a:rPr>
+                        <m:t>=</m:t>
+                      </m:r>
+                      <m:r>
+                        <a:rPr lang="en-US" sz="2000" i="1">
+                          <a:latin typeface="Cambria Math" panose="02040503050406030204" pitchFamily="18" charset="0"/>
+                          <a:ea typeface="Cambria Math" panose="02040503050406030204" pitchFamily="18" charset="0"/>
+                        </a:rPr>
+                        <m:t>𝜑</m:t>
+                      </m:r>
+                      <m:sSup>
+                        <m:sSupPr>
+                          <m:ctrlPr>
+                            <a:rPr lang="en-US" sz="2000" b="0" i="1" smtClean="0">
+                              <a:latin typeface="Cambria Math" panose="02040503050406030204" pitchFamily="18" charset="0"/>
+                              <a:ea typeface="Cambria Math" panose="02040503050406030204" pitchFamily="18" charset="0"/>
+                            </a:rPr>
+                          </m:ctrlPr>
+                        </m:sSupPr>
+                        <m:e>
+                          <m:r>
+                            <a:rPr lang="en-US" sz="2000" b="0" i="1" smtClean="0">
+                              <a:latin typeface="Cambria Math" panose="02040503050406030204" pitchFamily="18" charset="0"/>
+                              <a:ea typeface="Cambria Math" panose="02040503050406030204" pitchFamily="18" charset="0"/>
+                            </a:rPr>
+                            <m:t>𝜌</m:t>
+                          </m:r>
+                        </m:e>
+                        <m:sup>
+                          <m:r>
+                            <a:rPr lang="en-US" sz="2000" i="1">
+                              <a:latin typeface="Cambria Math" panose="02040503050406030204" pitchFamily="18" charset="0"/>
+                              <a:ea typeface="Cambria Math" panose="02040503050406030204" pitchFamily="18" charset="0"/>
+                            </a:rPr>
+                            <m:t>𝑡</m:t>
+                          </m:r>
+                          <m:r>
+                            <a:rPr lang="en-US" sz="2000" i="1">
+                              <a:latin typeface="Cambria Math" panose="02040503050406030204" pitchFamily="18" charset="0"/>
+                              <a:ea typeface="Cambria Math" panose="02040503050406030204" pitchFamily="18" charset="0"/>
+                            </a:rPr>
+                            <m:t>−1</m:t>
+                          </m:r>
+                        </m:sup>
+                      </m:sSup>
+                      <m:r>
+                        <a:rPr lang="en-US" sz="2000" b="0" i="1" smtClean="0">
+                          <a:latin typeface="Cambria Math" panose="02040503050406030204" pitchFamily="18" charset="0"/>
+                          <a:ea typeface="Cambria Math" panose="02040503050406030204" pitchFamily="18" charset="0"/>
+                        </a:rPr>
+                        <m:t>+</m:t>
+                      </m:r>
+                      <m:r>
+                        <a:rPr lang="en-US" sz="2000" b="0" i="1" smtClean="0">
+                          <a:latin typeface="Cambria Math" panose="02040503050406030204" pitchFamily="18" charset="0"/>
+                          <a:ea typeface="Cambria Math" panose="02040503050406030204" pitchFamily="18" charset="0"/>
+                        </a:rPr>
+                        <m:t>𝛼</m:t>
+                      </m:r>
+                      <m:r>
+                        <a:rPr lang="en-US" sz="2000" b="0" i="1" smtClean="0">
+                          <a:latin typeface="Cambria Math" panose="02040503050406030204" pitchFamily="18" charset="0"/>
+                          <a:ea typeface="Cambria Math" panose="02040503050406030204" pitchFamily="18" charset="0"/>
+                        </a:rPr>
+                        <m:t>+</m:t>
+                      </m:r>
+                      <m:sSub>
+                        <m:sSubPr>
+                          <m:ctrlPr>
+                            <a:rPr lang="en-US" sz="2000" b="0" i="1" smtClean="0">
+                              <a:latin typeface="Cambria Math" panose="02040503050406030204" pitchFamily="18" charset="0"/>
+                              <a:ea typeface="Cambria Math" panose="02040503050406030204" pitchFamily="18" charset="0"/>
+                            </a:rPr>
+                          </m:ctrlPr>
+                        </m:sSubPr>
+                        <m:e>
+                          <m:r>
+                            <a:rPr lang="en-US" sz="2000" b="1" i="0" smtClean="0">
+                              <a:latin typeface="Cambria Math" panose="02040503050406030204" pitchFamily="18" charset="0"/>
+                              <a:ea typeface="Cambria Math" panose="02040503050406030204" pitchFamily="18" charset="0"/>
+                            </a:rPr>
+                            <m:t>𝛙</m:t>
+                          </m:r>
+                        </m:e>
+                        <m:sub>
+                          <m:r>
+                            <a:rPr lang="en-US" sz="2000" b="0" i="1" smtClean="0">
+                              <a:latin typeface="Cambria Math" panose="02040503050406030204" pitchFamily="18" charset="0"/>
+                              <a:ea typeface="Cambria Math" panose="02040503050406030204" pitchFamily="18" charset="0"/>
+                            </a:rPr>
+                            <m:t>𝑡</m:t>
+                          </m:r>
+                        </m:sub>
+                      </m:sSub>
+                    </m:oMath>
+                  </m:oMathPara>
+                </a14:m>
+                <a:endParaRPr lang="en-US" sz="2000" b="0" dirty="0" smtClean="0">
+                  <a:ea typeface="Cambria Math" panose="02040503050406030204" pitchFamily="18" charset="0"/>
+                </a:endParaRPr>
+              </a:p>
+              <a:p>
+                <a:pPr marL="0" indent="0">
+                  <a:buNone/>
+                </a:pPr>
+                <a14:m>
+                  <m:oMathPara xmlns:m="http://schemas.openxmlformats.org/officeDocument/2006/math">
+                    <m:oMathParaPr>
+                      <m:jc m:val="centerGroup"/>
+                    </m:oMathParaPr>
+                    <m:oMath xmlns:m="http://schemas.openxmlformats.org/officeDocument/2006/math">
+                      <m:r>
+                        <m:rPr>
+                          <m:sty m:val="p"/>
+                        </m:rPr>
+                        <a:rPr lang="en-US" sz="2000" b="0" i="0" smtClean="0">
+                          <a:latin typeface="Cambria Math" panose="02040503050406030204" pitchFamily="18" charset="0"/>
+                          <a:ea typeface="Cambria Math" panose="02040503050406030204" pitchFamily="18" charset="0"/>
+                        </a:rPr>
+                        <m:t>vec</m:t>
+                      </m:r>
+                      <m:r>
+                        <a:rPr lang="en-US" sz="2000" b="0" i="1" smtClean="0">
+                          <a:latin typeface="Cambria Math" panose="02040503050406030204" pitchFamily="18" charset="0"/>
+                          <a:ea typeface="Cambria Math" panose="02040503050406030204" pitchFamily="18" charset="0"/>
+                        </a:rPr>
+                        <m:t>(</m:t>
+                      </m:r>
+                      <m:r>
+                        <a:rPr lang="en-US" sz="2000" b="1" i="0" smtClean="0">
+                          <a:latin typeface="Cambria Math" panose="02040503050406030204" pitchFamily="18" charset="0"/>
+                          <a:ea typeface="Cambria Math" panose="02040503050406030204" pitchFamily="18" charset="0"/>
+                        </a:rPr>
+                        <m:t>𝐔</m:t>
+                      </m:r>
+                      <m:r>
+                        <a:rPr lang="en-US" sz="2000" b="0" i="1" smtClean="0">
+                          <a:latin typeface="Cambria Math" panose="02040503050406030204" pitchFamily="18" charset="0"/>
+                          <a:ea typeface="Cambria Math" panose="02040503050406030204" pitchFamily="18" charset="0"/>
+                        </a:rPr>
+                        <m:t>)</m:t>
+                      </m:r>
+                      <m:r>
+                        <a:rPr lang="en-US" sz="2000" b="0" i="1" smtClean="0">
+                          <a:latin typeface="Cambria Math" panose="02040503050406030204" pitchFamily="18" charset="0"/>
+                          <a:ea typeface="Cambria Math" panose="02040503050406030204" pitchFamily="18" charset="0"/>
+                        </a:rPr>
+                        <m:t>~</m:t>
+                      </m:r>
+                      <m:r>
+                        <m:rPr>
+                          <m:sty m:val="p"/>
+                        </m:rPr>
+                        <a:rPr lang="en-US" sz="2000" b="0" i="0" smtClean="0">
+                          <a:latin typeface="Cambria Math" panose="02040503050406030204" pitchFamily="18" charset="0"/>
+                          <a:ea typeface="Cambria Math" panose="02040503050406030204" pitchFamily="18" charset="0"/>
+                        </a:rPr>
+                        <m:t>MVN</m:t>
+                      </m:r>
+                      <m:r>
+                        <a:rPr lang="en-US" sz="2000" b="0" i="1" smtClean="0">
+                          <a:latin typeface="Cambria Math" panose="02040503050406030204" pitchFamily="18" charset="0"/>
+                          <a:ea typeface="Cambria Math" panose="02040503050406030204" pitchFamily="18" charset="0"/>
+                        </a:rPr>
+                        <m:t>(</m:t>
+                      </m:r>
+                      <m:r>
+                        <a:rPr lang="en-US" sz="2000" b="1" i="1" smtClean="0">
+                          <a:latin typeface="Cambria Math" panose="02040503050406030204" pitchFamily="18" charset="0"/>
+                          <a:ea typeface="Cambria Math" panose="02040503050406030204" pitchFamily="18" charset="0"/>
+                        </a:rPr>
+                        <m:t>𝟎</m:t>
+                      </m:r>
+                      <m:r>
+                        <a:rPr lang="en-US" sz="2000" b="0" i="1" smtClean="0">
+                          <a:latin typeface="Cambria Math" panose="02040503050406030204" pitchFamily="18" charset="0"/>
+                          <a:ea typeface="Cambria Math" panose="02040503050406030204" pitchFamily="18" charset="0"/>
+                        </a:rPr>
+                        <m:t>,</m:t>
+                      </m:r>
+                      <m:f>
+                        <m:fPr>
+                          <m:ctrlPr>
+                            <a:rPr lang="en-US" sz="2000" b="0" i="1" smtClean="0">
+                              <a:latin typeface="Cambria Math" panose="02040503050406030204" pitchFamily="18" charset="0"/>
+                              <a:ea typeface="Cambria Math" panose="02040503050406030204" pitchFamily="18" charset="0"/>
+                            </a:rPr>
+                          </m:ctrlPr>
+                        </m:fPr>
+                        <m:num>
+                          <m:sSubSup>
+                            <m:sSubSupPr>
+                              <m:ctrlPr>
+                                <a:rPr lang="en-US" sz="2000" i="1">
+                                  <a:latin typeface="Cambria Math" panose="02040503050406030204" pitchFamily="18" charset="0"/>
+                                  <a:ea typeface="Cambria Math" panose="02040503050406030204" pitchFamily="18" charset="0"/>
+                                </a:rPr>
+                              </m:ctrlPr>
+                            </m:sSubSupPr>
+                            <m:e>
+                              <m:r>
+                                <a:rPr lang="en-US" sz="2000" i="1">
+                                  <a:latin typeface="Cambria Math" panose="02040503050406030204" pitchFamily="18" charset="0"/>
+                                  <a:ea typeface="Cambria Math" panose="02040503050406030204" pitchFamily="18" charset="0"/>
+                                </a:rPr>
+                                <m:t>𝜎</m:t>
+                              </m:r>
+                            </m:e>
+                            <m:sub>
+                              <m:r>
+                                <a:rPr lang="en-US" sz="2000" i="1">
+                                  <a:latin typeface="Cambria Math" panose="02040503050406030204" pitchFamily="18" charset="0"/>
+                                  <a:ea typeface="Cambria Math" panose="02040503050406030204" pitchFamily="18" charset="0"/>
+                                </a:rPr>
+                                <m:t>𝜔</m:t>
+                              </m:r>
+                            </m:sub>
+                            <m:sup>
+                              <m:r>
+                                <a:rPr lang="en-US" sz="2000" i="1">
+                                  <a:latin typeface="Cambria Math" panose="02040503050406030204" pitchFamily="18" charset="0"/>
+                                  <a:ea typeface="Cambria Math" panose="02040503050406030204" pitchFamily="18" charset="0"/>
+                                </a:rPr>
+                                <m:t>2</m:t>
+                              </m:r>
+                            </m:sup>
+                          </m:sSubSup>
+                        </m:num>
+                        <m:den>
+                          <m:r>
+                            <a:rPr lang="en-US" sz="2000" b="0" i="1" smtClean="0">
+                              <a:latin typeface="Cambria Math" panose="02040503050406030204" pitchFamily="18" charset="0"/>
+                              <a:ea typeface="Cambria Math" panose="02040503050406030204" pitchFamily="18" charset="0"/>
+                            </a:rPr>
+                            <m:t>1−</m:t>
+                          </m:r>
+                          <m:r>
+                            <a:rPr lang="en-US" sz="2000" b="0" i="1" smtClean="0">
+                              <a:latin typeface="Cambria Math" panose="02040503050406030204" pitchFamily="18" charset="0"/>
+                              <a:ea typeface="Cambria Math" panose="02040503050406030204" pitchFamily="18" charset="0"/>
+                            </a:rPr>
+                            <m:t>𝜌</m:t>
+                          </m:r>
+                        </m:den>
+                      </m:f>
+                      <m:sSub>
+                        <m:sSubPr>
+                          <m:ctrlPr>
+                            <a:rPr lang="en-US" sz="2000" b="0" i="1" smtClean="0">
+                              <a:latin typeface="Cambria Math" panose="02040503050406030204" pitchFamily="18" charset="0"/>
+                              <a:ea typeface="Cambria Math" panose="02040503050406030204" pitchFamily="18" charset="0"/>
+                            </a:rPr>
+                          </m:ctrlPr>
+                        </m:sSubPr>
+                        <m:e>
+                          <m:r>
+                            <a:rPr lang="en-US" sz="2000" b="1" i="0" smtClean="0">
+                              <a:latin typeface="Cambria Math" panose="02040503050406030204" pitchFamily="18" charset="0"/>
+                              <a:ea typeface="Cambria Math" panose="02040503050406030204" pitchFamily="18" charset="0"/>
+                            </a:rPr>
+                            <m:t>𝐑</m:t>
+                          </m:r>
+                        </m:e>
+                        <m:sub>
+                          <m:r>
+                            <a:rPr lang="en-US" sz="2000" b="0" i="1" smtClean="0">
+                              <a:latin typeface="Cambria Math" panose="02040503050406030204" pitchFamily="18" charset="0"/>
+                              <a:ea typeface="Cambria Math" panose="02040503050406030204" pitchFamily="18" charset="0"/>
+                            </a:rPr>
+                            <m:t>𝜔</m:t>
+                          </m:r>
+                        </m:sub>
+                      </m:sSub>
+                      <m:r>
+                        <a:rPr lang="en-US" sz="2000" i="1">
+                          <a:latin typeface="Cambria Math" panose="02040503050406030204" pitchFamily="18" charset="0"/>
+                          <a:ea typeface="Cambria Math" panose="02040503050406030204" pitchFamily="18" charset="0"/>
+                        </a:rPr>
+                        <m:t>⊗</m:t>
+                      </m:r>
+                      <m:sSub>
+                        <m:sSubPr>
+                          <m:ctrlPr>
+                            <a:rPr lang="en-US" sz="2000" b="1" i="0" smtClean="0">
+                              <a:latin typeface="Cambria Math" panose="02040503050406030204" pitchFamily="18" charset="0"/>
+                              <a:ea typeface="Cambria Math" panose="02040503050406030204" pitchFamily="18" charset="0"/>
+                            </a:rPr>
+                          </m:ctrlPr>
+                        </m:sSubPr>
+                        <m:e>
+                          <m:r>
+                            <a:rPr lang="en-US" sz="2000" b="1" i="0" smtClean="0">
+                              <a:latin typeface="Cambria Math" panose="02040503050406030204" pitchFamily="18" charset="0"/>
+                              <a:ea typeface="Cambria Math" panose="02040503050406030204" pitchFamily="18" charset="0"/>
+                            </a:rPr>
+                            <m:t>𝟏</m:t>
+                          </m:r>
+                        </m:e>
+                        <m:sub>
+                          <m:r>
+                            <a:rPr lang="en-US" sz="2000" b="0" i="1" smtClean="0">
+                              <a:latin typeface="Cambria Math" panose="02040503050406030204" pitchFamily="18" charset="0"/>
+                              <a:ea typeface="Cambria Math" panose="02040503050406030204" pitchFamily="18" charset="0"/>
+                            </a:rPr>
+                            <m:t>𝑡</m:t>
+                          </m:r>
+                        </m:sub>
+                      </m:sSub>
+                      <m:r>
+                        <a:rPr lang="en-US" sz="2000" b="1" i="0" smtClean="0">
+                          <a:latin typeface="Cambria Math" panose="02040503050406030204" pitchFamily="18" charset="0"/>
+                          <a:ea typeface="Cambria Math" panose="02040503050406030204" pitchFamily="18" charset="0"/>
+                        </a:rPr>
+                        <m:t>+</m:t>
+                      </m:r>
+                      <m:sSubSup>
+                        <m:sSubSupPr>
+                          <m:ctrlPr>
+                            <a:rPr lang="en-US" sz="2000" i="1">
+                              <a:latin typeface="Cambria Math" panose="02040503050406030204" pitchFamily="18" charset="0"/>
+                              <a:ea typeface="Cambria Math" panose="02040503050406030204" pitchFamily="18" charset="0"/>
+                            </a:rPr>
+                          </m:ctrlPr>
+                        </m:sSubSupPr>
+                        <m:e>
+                          <m:r>
+                            <a:rPr lang="en-US" sz="2000" i="1">
+                              <a:latin typeface="Cambria Math" panose="02040503050406030204" pitchFamily="18" charset="0"/>
+                              <a:ea typeface="Cambria Math" panose="02040503050406030204" pitchFamily="18" charset="0"/>
+                            </a:rPr>
+                            <m:t>𝜎</m:t>
+                          </m:r>
+                        </m:e>
+                        <m:sub>
+                          <m:r>
+                            <a:rPr lang="en-US" sz="2000" i="1">
+                              <a:latin typeface="Cambria Math" panose="02040503050406030204" pitchFamily="18" charset="0"/>
+                              <a:ea typeface="Cambria Math" panose="02040503050406030204" pitchFamily="18" charset="0"/>
+                            </a:rPr>
+                            <m:t>𝜀</m:t>
+                          </m:r>
+                        </m:sub>
+                        <m:sup>
+                          <m:r>
+                            <a:rPr lang="en-US" sz="2000" i="1">
+                              <a:latin typeface="Cambria Math" panose="02040503050406030204" pitchFamily="18" charset="0"/>
+                              <a:ea typeface="Cambria Math" panose="02040503050406030204" pitchFamily="18" charset="0"/>
+                            </a:rPr>
+                            <m:t>2</m:t>
+                          </m:r>
+                        </m:sup>
+                      </m:sSubSup>
+                      <m:sSub>
+                        <m:sSubPr>
+                          <m:ctrlPr>
+                            <a:rPr lang="en-US" sz="2000" i="1">
+                              <a:latin typeface="Cambria Math" panose="02040503050406030204" pitchFamily="18" charset="0"/>
+                              <a:ea typeface="Cambria Math" panose="02040503050406030204" pitchFamily="18" charset="0"/>
+                            </a:rPr>
+                          </m:ctrlPr>
+                        </m:sSubPr>
+                        <m:e>
+                          <m:r>
+                            <a:rPr lang="en-US" sz="2000" b="1">
+                              <a:latin typeface="Cambria Math" panose="02040503050406030204" pitchFamily="18" charset="0"/>
+                              <a:ea typeface="Cambria Math" panose="02040503050406030204" pitchFamily="18" charset="0"/>
+                            </a:rPr>
+                            <m:t>𝐑</m:t>
+                          </m:r>
+                        </m:e>
+                        <m:sub>
+                          <m:r>
+                            <a:rPr lang="en-US" sz="2000" i="1">
+                              <a:latin typeface="Cambria Math" panose="02040503050406030204" pitchFamily="18" charset="0"/>
+                              <a:ea typeface="Cambria Math" panose="02040503050406030204" pitchFamily="18" charset="0"/>
+                            </a:rPr>
+                            <m:t>𝜀</m:t>
+                          </m:r>
+                        </m:sub>
+                      </m:sSub>
+                      <m:r>
+                        <a:rPr lang="en-US" sz="2000" i="1">
+                          <a:latin typeface="Cambria Math" panose="02040503050406030204" pitchFamily="18" charset="0"/>
+                          <a:ea typeface="Cambria Math" panose="02040503050406030204" pitchFamily="18" charset="0"/>
+                        </a:rPr>
+                        <m:t>⊗</m:t>
+                      </m:r>
+                      <m:sSub>
+                        <m:sSubPr>
+                          <m:ctrlPr>
+                            <a:rPr lang="en-US" sz="2000" i="1">
+                              <a:latin typeface="Cambria Math" panose="02040503050406030204" pitchFamily="18" charset="0"/>
+                              <a:ea typeface="Cambria Math" panose="02040503050406030204" pitchFamily="18" charset="0"/>
+                            </a:rPr>
+                          </m:ctrlPr>
+                        </m:sSubPr>
+                        <m:e>
+                          <m:r>
+                            <a:rPr lang="en-US" sz="2000" b="1">
+                              <a:latin typeface="Cambria Math" panose="02040503050406030204" pitchFamily="18" charset="0"/>
+                              <a:ea typeface="Cambria Math" panose="02040503050406030204" pitchFamily="18" charset="0"/>
+                            </a:rPr>
+                            <m:t>𝐑</m:t>
+                          </m:r>
+                        </m:e>
+                        <m:sub>
+                          <m:r>
+                            <a:rPr lang="en-US" sz="2000" i="1">
+                              <a:latin typeface="Cambria Math" panose="02040503050406030204" pitchFamily="18" charset="0"/>
+                              <a:ea typeface="Cambria Math" panose="02040503050406030204" pitchFamily="18" charset="0"/>
+                            </a:rPr>
+                            <m:t>𝑡</m:t>
+                          </m:r>
+                        </m:sub>
+                      </m:sSub>
+                      <m:r>
+                        <a:rPr lang="en-US" sz="2000" b="0" i="1" smtClean="0">
+                          <a:latin typeface="Cambria Math" panose="02040503050406030204" pitchFamily="18" charset="0"/>
+                          <a:ea typeface="Cambria Math" panose="02040503050406030204" pitchFamily="18" charset="0"/>
+                        </a:rPr>
+                        <m:t>)</m:t>
+                      </m:r>
+                    </m:oMath>
+                  </m:oMathPara>
+                </a14:m>
+                <a:endParaRPr lang="en-GB" sz="2000" dirty="0" smtClean="0"/>
+              </a:p>
+              <a:p>
+                <a:pPr marL="400050" lvl="1" indent="0">
+                  <a:buNone/>
+                </a:pPr>
+                <a:r>
+                  <a:rPr lang="en-US" sz="1800" dirty="0" smtClean="0"/>
+                  <a:t>Where </a:t>
+                </a:r>
+                <a14:m>
+                  <m:oMath xmlns:m="http://schemas.openxmlformats.org/officeDocument/2006/math">
+                    <m:sSub>
+                      <m:sSubPr>
+                        <m:ctrlPr>
+                          <a:rPr lang="en-US" sz="1800" i="1">
+                            <a:latin typeface="Cambria Math" panose="02040503050406030204" pitchFamily="18" charset="0"/>
+                            <a:ea typeface="Cambria Math" panose="02040503050406030204" pitchFamily="18" charset="0"/>
+                          </a:rPr>
+                        </m:ctrlPr>
+                      </m:sSubPr>
+                      <m:e>
+                        <m:r>
+                          <a:rPr lang="en-US" sz="1800" b="1" i="0" smtClean="0">
+                            <a:latin typeface="Cambria Math" panose="02040503050406030204" pitchFamily="18" charset="0"/>
+                            <a:ea typeface="Cambria Math" panose="02040503050406030204" pitchFamily="18" charset="0"/>
+                          </a:rPr>
+                          <m:t>𝛙</m:t>
+                        </m:r>
+                      </m:e>
+                      <m:sub>
+                        <m:r>
+                          <a:rPr lang="en-US" sz="1800" i="1">
+                            <a:latin typeface="Cambria Math" panose="02040503050406030204" pitchFamily="18" charset="0"/>
+                            <a:ea typeface="Cambria Math" panose="02040503050406030204" pitchFamily="18" charset="0"/>
+                          </a:rPr>
+                          <m:t>𝑡</m:t>
+                        </m:r>
+                      </m:sub>
+                    </m:sSub>
+                    <m:r>
+                      <a:rPr lang="en-US" sz="1800" i="1" smtClean="0">
+                        <a:latin typeface="Cambria Math" panose="02040503050406030204" pitchFamily="18" charset="0"/>
+                        <a:ea typeface="Cambria Math" panose="02040503050406030204" pitchFamily="18" charset="0"/>
+                      </a:rPr>
+                      <m:t>≡</m:t>
+                    </m:r>
+                    <m:r>
+                      <a:rPr lang="en-US" sz="1800" b="1">
+                        <a:latin typeface="Cambria Math" panose="02040503050406030204" pitchFamily="18" charset="0"/>
+                        <a:ea typeface="Cambria Math" panose="02040503050406030204" pitchFamily="18" charset="0"/>
+                      </a:rPr>
+                      <m:t>𝛚</m:t>
+                    </m:r>
+                    <m:r>
+                      <a:rPr lang="en-US" sz="1800" i="1">
+                        <a:latin typeface="Cambria Math" panose="02040503050406030204" pitchFamily="18" charset="0"/>
+                        <a:ea typeface="Cambria Math" panose="02040503050406030204" pitchFamily="18" charset="0"/>
+                      </a:rPr>
+                      <m:t>+</m:t>
+                    </m:r>
+                    <m:sSub>
+                      <m:sSubPr>
+                        <m:ctrlPr>
+                          <a:rPr lang="en-US" sz="1800" i="1">
+                            <a:latin typeface="Cambria Math" panose="02040503050406030204" pitchFamily="18" charset="0"/>
+                            <a:ea typeface="Cambria Math" panose="02040503050406030204" pitchFamily="18" charset="0"/>
+                          </a:rPr>
+                        </m:ctrlPr>
+                      </m:sSubPr>
+                      <m:e>
+                        <m:r>
+                          <a:rPr lang="en-US" sz="1800" b="1">
+                            <a:latin typeface="Cambria Math" panose="02040503050406030204" pitchFamily="18" charset="0"/>
+                            <a:ea typeface="Cambria Math" panose="02040503050406030204" pitchFamily="18" charset="0"/>
+                          </a:rPr>
+                          <m:t>𝛆</m:t>
+                        </m:r>
+                      </m:e>
+                      <m:sub>
+                        <m:r>
+                          <a:rPr lang="en-US" sz="1800" i="1">
+                            <a:latin typeface="Cambria Math" panose="02040503050406030204" pitchFamily="18" charset="0"/>
+                            <a:ea typeface="Cambria Math" panose="02040503050406030204" pitchFamily="18" charset="0"/>
+                          </a:rPr>
+                          <m:t>𝑡</m:t>
+                        </m:r>
+                      </m:sub>
+                    </m:sSub>
+                  </m:oMath>
+                </a14:m>
+                <a:endParaRPr lang="en-US" sz="1800" dirty="0" smtClean="0"/>
+              </a:p>
+              <a:p>
+                <a:pPr marL="400050" lvl="1" indent="0">
+                  <a:buNone/>
+                </a:pPr>
+                <a:r>
+                  <a:rPr lang="en-US" sz="1800" dirty="0" smtClean="0"/>
+                  <a:t>Where </a:t>
+                </a:r>
+                <a14:m>
+                  <m:oMath xmlns:m="http://schemas.openxmlformats.org/officeDocument/2006/math">
+                    <m:r>
+                      <a:rPr lang="en-US" sz="1800" b="1">
+                        <a:latin typeface="Cambria Math" panose="02040503050406030204" pitchFamily="18" charset="0"/>
+                        <a:ea typeface="Cambria Math" panose="02040503050406030204" pitchFamily="18" charset="0"/>
+                      </a:rPr>
+                      <m:t>𝐑</m:t>
+                    </m:r>
+                  </m:oMath>
+                </a14:m>
+                <a:r>
+                  <a:rPr lang="en-GB" sz="1800" dirty="0"/>
+                  <a:t> is the correlation matrix for 1</a:t>
+                </a:r>
+                <a:r>
+                  <a:rPr lang="en-GB" sz="1800" baseline="30000" dirty="0"/>
+                  <a:t>st</a:t>
+                </a:r>
+                <a:r>
+                  <a:rPr lang="en-GB" sz="1800" dirty="0"/>
+                  <a:t> order </a:t>
+                </a:r>
+                <a:r>
+                  <a:rPr lang="en-GB" sz="1800" dirty="0" smtClean="0"/>
+                  <a:t>autocorrelation</a:t>
+                </a:r>
+              </a:p>
+              <a:p>
+                <a:pPr marL="0" indent="0">
+                  <a:buNone/>
+                </a:pPr>
+                <a:endParaRPr lang="en-GB" sz="2000" dirty="0"/>
+              </a:p>
+            </p:txBody>
+          </p:sp>
+        </mc:Choice>
+        <mc:Fallback>
+          <p:sp>
+            <p:nvSpPr>
+              <p:cNvPr id="3" name="Content Placeholder 2"/>
+              <p:cNvSpPr>
+                <a:spLocks noGrp="1" noRot="1" noChangeAspect="1" noMove="1" noResize="1" noEditPoints="1" noAdjustHandles="1" noChangeArrowheads="1" noChangeShapeType="1" noTextEdit="1"/>
+              </p:cNvSpPr>
+              <p:nvPr>
+                <p:ph idx="1"/>
+              </p:nvPr>
+            </p:nvSpPr>
+            <p:spPr>
+              <a:blipFill>
+                <a:blip r:embed="rId2"/>
+                <a:stretch>
+                  <a:fillRect l="-746" t="-615"/>
+                </a:stretch>
+              </a:blipFill>
+            </p:spPr>
+            <p:txBody>
+              <a:bodyPr/>
+              <a:lstStyle/>
+              <a:p>
+                <a:r>
+                  <a:rPr lang="en-GB">
+                    <a:noFill/>
+                  </a:rPr>
+                  <a:t> </a:t>
+                </a:r>
+              </a:p>
+            </p:txBody>
+          </p:sp>
+        </mc:Fallback>
+      </mc:AlternateContent>
+      <mc:AlternateContent xmlns:mc="http://schemas.openxmlformats.org/markup-compatibility/2006" xmlns:a14="http://schemas.microsoft.com/office/drawing/2010/main">
+        <mc:Choice Requires="a14">
+          <p:sp>
+            <p:nvSpPr>
+              <p:cNvPr id="4" name="Rectangle 3"/>
+              <p:cNvSpPr/>
+              <p:nvPr/>
+            </p:nvSpPr>
+            <p:spPr>
+              <a:xfrm>
+                <a:off x="2060880" y="4206475"/>
+                <a:ext cx="5221686" cy="2015103"/>
+              </a:xfrm>
+              <a:prstGeom prst="rect">
+                <a:avLst/>
+              </a:prstGeom>
+            </p:spPr>
+            <p:txBody>
+              <a:bodyPr wrap="none">
+                <a:spAutoFit/>
+              </a:bodyPr>
+              <a:lstStyle/>
+              <a:p>
+                <a:pPr/>
+                <a14:m>
+                  <m:oMathPara xmlns:m="http://schemas.openxmlformats.org/officeDocument/2006/math">
+                    <m:oMathParaPr>
+                      <m:jc m:val="centerGroup"/>
+                    </m:oMathParaPr>
+                    <m:oMath xmlns:m="http://schemas.openxmlformats.org/officeDocument/2006/math">
+                      <m:sSub>
+                        <m:sSubPr>
+                          <m:ctrlPr>
+                            <a:rPr lang="en-US" sz="2400" b="0" i="1" smtClean="0">
+                              <a:latin typeface="Cambria Math" panose="02040503050406030204" pitchFamily="18" charset="0"/>
+                            </a:rPr>
+                          </m:ctrlPr>
+                        </m:sSubPr>
+                        <m:e>
+                          <m:r>
+                            <a:rPr lang="en-US" sz="2400" b="1" i="0" smtClean="0">
+                              <a:latin typeface="Cambria Math" panose="02040503050406030204" pitchFamily="18" charset="0"/>
+                            </a:rPr>
+                            <m:t>𝐑</m:t>
+                          </m:r>
+                        </m:e>
+                        <m:sub>
+                          <m:r>
+                            <a:rPr lang="en-US" sz="2400" b="0" i="1" smtClean="0">
+                              <a:latin typeface="Cambria Math" panose="02040503050406030204" pitchFamily="18" charset="0"/>
+                            </a:rPr>
+                            <m:t>𝑡</m:t>
+                          </m:r>
+                        </m:sub>
+                      </m:sSub>
+                      <m:r>
+                        <a:rPr lang="en-US" sz="2400" b="0" i="1" smtClean="0">
+                          <a:latin typeface="Cambria Math" panose="02040503050406030204" pitchFamily="18" charset="0"/>
+                        </a:rPr>
+                        <m:t>=</m:t>
+                      </m:r>
+                      <m:d>
+                        <m:dPr>
+                          <m:begChr m:val="["/>
+                          <m:endChr m:val="]"/>
+                          <m:ctrlPr>
+                            <a:rPr lang="en-GB" sz="2400" i="1">
+                              <a:latin typeface="Cambria Math" panose="02040503050406030204" pitchFamily="18" charset="0"/>
+                            </a:rPr>
+                          </m:ctrlPr>
+                        </m:dPr>
+                        <m:e>
+                          <m:m>
+                            <m:mPr>
+                              <m:mcs>
+                                <m:mc>
+                                  <m:mcPr>
+                                    <m:count m:val="5"/>
+                                    <m:mcJc m:val="center"/>
+                                  </m:mcPr>
+                                </m:mc>
+                              </m:mcs>
+                              <m:ctrlPr>
+                                <a:rPr lang="en-GB" sz="2400" i="1">
+                                  <a:latin typeface="Cambria Math" panose="02040503050406030204" pitchFamily="18" charset="0"/>
+                                </a:rPr>
+                              </m:ctrlPr>
+                            </m:mPr>
+                            <m:mr>
+                              <m:e>
+                                <m:r>
+                                  <a:rPr lang="en-GB" sz="2400">
+                                    <a:latin typeface="Cambria Math" panose="02040503050406030204" pitchFamily="18" charset="0"/>
+                                  </a:rPr>
+                                  <m:t>1</m:t>
+                                </m:r>
+                              </m:e>
+                              <m:e>
+                                <m:r>
+                                  <a:rPr lang="en-GB" sz="2400" i="1">
+                                    <a:latin typeface="Cambria Math" panose="02040503050406030204" pitchFamily="18" charset="0"/>
+                                  </a:rPr>
+                                  <m:t>𝜌</m:t>
+                                </m:r>
+                              </m:e>
+                              <m:e>
+                                <m:sSup>
+                                  <m:sSupPr>
+                                    <m:ctrlPr>
+                                      <a:rPr lang="en-GB" sz="2400" i="1">
+                                        <a:latin typeface="Cambria Math" panose="02040503050406030204" pitchFamily="18" charset="0"/>
+                                      </a:rPr>
+                                    </m:ctrlPr>
+                                  </m:sSupPr>
+                                  <m:e>
+                                    <m:r>
+                                      <a:rPr lang="en-GB" sz="2400" i="1">
+                                        <a:latin typeface="Cambria Math" panose="02040503050406030204" pitchFamily="18" charset="0"/>
+                                      </a:rPr>
+                                      <m:t>𝜌</m:t>
+                                    </m:r>
+                                  </m:e>
+                                  <m:sup>
+                                    <m:r>
+                                      <a:rPr lang="en-GB" sz="2400" i="0">
+                                        <a:latin typeface="Cambria Math" panose="02040503050406030204" pitchFamily="18" charset="0"/>
+                                      </a:rPr>
+                                      <m:t>2</m:t>
+                                    </m:r>
+                                  </m:sup>
+                                </m:sSup>
+                              </m:e>
+                              <m:e>
+                                <m:r>
+                                  <a:rPr lang="en-GB" sz="2400" i="0">
+                                    <a:latin typeface="Cambria Math" panose="02040503050406030204" pitchFamily="18" charset="0"/>
+                                  </a:rPr>
+                                  <m:t>...</m:t>
+                                </m:r>
+                              </m:e>
+                              <m:e>
+                                <m:sSup>
+                                  <m:sSupPr>
+                                    <m:ctrlPr>
+                                      <a:rPr lang="en-GB" sz="2400" i="1">
+                                        <a:latin typeface="Cambria Math" panose="02040503050406030204" pitchFamily="18" charset="0"/>
+                                      </a:rPr>
+                                    </m:ctrlPr>
+                                  </m:sSupPr>
+                                  <m:e>
+                                    <m:r>
+                                      <a:rPr lang="en-GB" sz="2400" i="1">
+                                        <a:latin typeface="Cambria Math" panose="02040503050406030204" pitchFamily="18" charset="0"/>
+                                      </a:rPr>
+                                      <m:t>𝜌</m:t>
+                                    </m:r>
+                                  </m:e>
+                                  <m:sup>
+                                    <m:r>
+                                      <a:rPr lang="en-US" sz="2400" b="0" i="1" smtClean="0">
+                                        <a:latin typeface="Cambria Math" panose="02040503050406030204" pitchFamily="18" charset="0"/>
+                                      </a:rPr>
+                                      <m:t>𝑇</m:t>
+                                    </m:r>
+                                    <m:r>
+                                      <a:rPr lang="en-GB" sz="2400" i="0">
+                                        <a:latin typeface="Cambria Math" panose="02040503050406030204" pitchFamily="18" charset="0"/>
+                                      </a:rPr>
+                                      <m:t>−1</m:t>
+                                    </m:r>
+                                  </m:sup>
+                                </m:sSup>
+                              </m:e>
+                            </m:mr>
+                            <m:mr>
+                              <m:e>
+                                <m:r>
+                                  <a:rPr lang="en-GB" sz="2400" i="1">
+                                    <a:latin typeface="Cambria Math" panose="02040503050406030204" pitchFamily="18" charset="0"/>
+                                  </a:rPr>
+                                  <m:t>𝜌</m:t>
+                                </m:r>
+                              </m:e>
+                              <m:e>
+                                <m:r>
+                                  <a:rPr lang="en-GB" sz="2400" i="0">
+                                    <a:latin typeface="Cambria Math" panose="02040503050406030204" pitchFamily="18" charset="0"/>
+                                  </a:rPr>
+                                  <m:t>1</m:t>
+                                </m:r>
+                              </m:e>
+                              <m:e>
+                                <m:r>
+                                  <a:rPr lang="en-GB" sz="2400" i="1">
+                                    <a:latin typeface="Cambria Math" panose="02040503050406030204" pitchFamily="18" charset="0"/>
+                                  </a:rPr>
+                                  <m:t>𝜌</m:t>
+                                </m:r>
+                              </m:e>
+                              <m:e>
+                                <m:r>
+                                  <a:rPr lang="en-GB" sz="2400" i="0">
+                                    <a:latin typeface="Cambria Math" panose="02040503050406030204" pitchFamily="18" charset="0"/>
+                                  </a:rPr>
+                                  <m:t>...</m:t>
+                                </m:r>
+                              </m:e>
+                              <m:e>
+                                <m:sSup>
+                                  <m:sSupPr>
+                                    <m:ctrlPr>
+                                      <a:rPr lang="en-GB" sz="2400" i="1">
+                                        <a:latin typeface="Cambria Math" panose="02040503050406030204" pitchFamily="18" charset="0"/>
+                                      </a:rPr>
+                                    </m:ctrlPr>
+                                  </m:sSupPr>
+                                  <m:e>
+                                    <m:r>
+                                      <a:rPr lang="en-GB" sz="2400" i="1">
+                                        <a:latin typeface="Cambria Math" panose="02040503050406030204" pitchFamily="18" charset="0"/>
+                                      </a:rPr>
+                                      <m:t>𝜌</m:t>
+                                    </m:r>
+                                  </m:e>
+                                  <m:sup>
+                                    <m:r>
+                                      <a:rPr lang="en-US" sz="2400" b="0" i="1" smtClean="0">
+                                        <a:latin typeface="Cambria Math" panose="02040503050406030204" pitchFamily="18" charset="0"/>
+                                      </a:rPr>
+                                      <m:t>𝑇</m:t>
+                                    </m:r>
+                                    <m:r>
+                                      <a:rPr lang="en-GB" sz="2400" i="0">
+                                        <a:latin typeface="Cambria Math" panose="02040503050406030204" pitchFamily="18" charset="0"/>
+                                      </a:rPr>
+                                      <m:t>−2</m:t>
+                                    </m:r>
+                                  </m:sup>
+                                </m:sSup>
+                              </m:e>
+                            </m:mr>
+                            <m:mr>
+                              <m:e>
+                                <m:sSup>
+                                  <m:sSupPr>
+                                    <m:ctrlPr>
+                                      <a:rPr lang="en-GB" sz="2400" i="1">
+                                        <a:latin typeface="Cambria Math" panose="02040503050406030204" pitchFamily="18" charset="0"/>
+                                      </a:rPr>
+                                    </m:ctrlPr>
+                                  </m:sSupPr>
+                                  <m:e>
+                                    <m:r>
+                                      <a:rPr lang="en-GB" sz="2400" i="1">
+                                        <a:latin typeface="Cambria Math" panose="02040503050406030204" pitchFamily="18" charset="0"/>
+                                      </a:rPr>
+                                      <m:t>𝜌</m:t>
+                                    </m:r>
+                                  </m:e>
+                                  <m:sup>
+                                    <m:r>
+                                      <a:rPr lang="en-GB" sz="2400" i="0">
+                                        <a:latin typeface="Cambria Math" panose="02040503050406030204" pitchFamily="18" charset="0"/>
+                                      </a:rPr>
+                                      <m:t>2</m:t>
+                                    </m:r>
+                                  </m:sup>
+                                </m:sSup>
+                              </m:e>
+                              <m:e>
+                                <m:r>
+                                  <a:rPr lang="en-GB" sz="2400" i="1">
+                                    <a:latin typeface="Cambria Math" panose="02040503050406030204" pitchFamily="18" charset="0"/>
+                                  </a:rPr>
+                                  <m:t>𝜌</m:t>
+                                </m:r>
+                              </m:e>
+                              <m:e>
+                                <m:r>
+                                  <a:rPr lang="en-GB" sz="2400" i="0">
+                                    <a:latin typeface="Cambria Math" panose="02040503050406030204" pitchFamily="18" charset="0"/>
+                                  </a:rPr>
+                                  <m:t>1</m:t>
+                                </m:r>
+                              </m:e>
+                              <m:e>
+                                <m:r>
+                                  <a:rPr lang="en-GB" sz="2400" i="0">
+                                    <a:latin typeface="Cambria Math" panose="02040503050406030204" pitchFamily="18" charset="0"/>
+                                  </a:rPr>
+                                  <m:t>...</m:t>
+                                </m:r>
+                              </m:e>
+                              <m:e>
+                                <m:sSup>
+                                  <m:sSupPr>
+                                    <m:ctrlPr>
+                                      <a:rPr lang="en-GB" sz="2400" i="1">
+                                        <a:latin typeface="Cambria Math" panose="02040503050406030204" pitchFamily="18" charset="0"/>
+                                      </a:rPr>
+                                    </m:ctrlPr>
+                                  </m:sSupPr>
+                                  <m:e>
+                                    <m:r>
+                                      <a:rPr lang="en-GB" sz="2400" i="1">
+                                        <a:latin typeface="Cambria Math" panose="02040503050406030204" pitchFamily="18" charset="0"/>
+                                      </a:rPr>
+                                      <m:t>𝜌</m:t>
+                                    </m:r>
+                                  </m:e>
+                                  <m:sup>
+                                    <m:r>
+                                      <a:rPr lang="en-US" sz="2400" b="0" i="1" smtClean="0">
+                                        <a:latin typeface="Cambria Math" panose="02040503050406030204" pitchFamily="18" charset="0"/>
+                                      </a:rPr>
+                                      <m:t>𝑇</m:t>
+                                    </m:r>
+                                    <m:r>
+                                      <a:rPr lang="en-GB" sz="2400" i="0">
+                                        <a:latin typeface="Cambria Math" panose="02040503050406030204" pitchFamily="18" charset="0"/>
+                                      </a:rPr>
+                                      <m:t>−3</m:t>
+                                    </m:r>
+                                  </m:sup>
+                                </m:sSup>
+                              </m:e>
+                            </m:mr>
+                            <m:mr>
+                              <m:e>
+                                <m:r>
+                                  <a:rPr lang="en-GB" sz="2400" i="0">
+                                    <a:latin typeface="Cambria Math" panose="02040503050406030204" pitchFamily="18" charset="0"/>
+                                  </a:rPr>
+                                  <m:t>...</m:t>
+                                </m:r>
+                              </m:e>
+                              <m:e>
+                                <m:r>
+                                  <a:rPr lang="en-GB" sz="2400" i="0">
+                                    <a:latin typeface="Cambria Math" panose="02040503050406030204" pitchFamily="18" charset="0"/>
+                                  </a:rPr>
+                                  <m:t>...</m:t>
+                                </m:r>
+                              </m:e>
+                              <m:e>
+                                <m:r>
+                                  <a:rPr lang="en-GB" sz="2400" i="0">
+                                    <a:latin typeface="Cambria Math" panose="02040503050406030204" pitchFamily="18" charset="0"/>
+                                  </a:rPr>
+                                  <m:t>...</m:t>
+                                </m:r>
+                              </m:e>
+                              <m:e>
+                                <m:r>
+                                  <a:rPr lang="en-GB" sz="2400" i="0">
+                                    <a:latin typeface="Cambria Math" panose="02040503050406030204" pitchFamily="18" charset="0"/>
+                                  </a:rPr>
+                                  <m:t>...</m:t>
+                                </m:r>
+                              </m:e>
+                              <m:e>
+                                <m:r>
+                                  <a:rPr lang="en-GB" sz="2400" i="0">
+                                    <a:latin typeface="Cambria Math" panose="02040503050406030204" pitchFamily="18" charset="0"/>
+                                  </a:rPr>
+                                  <m:t>...</m:t>
+                                </m:r>
+                              </m:e>
+                            </m:mr>
+                            <m:mr>
+                              <m:e>
+                                <m:sSup>
+                                  <m:sSupPr>
+                                    <m:ctrlPr>
+                                      <a:rPr lang="en-GB" sz="2400" i="1">
+                                        <a:latin typeface="Cambria Math" panose="02040503050406030204" pitchFamily="18" charset="0"/>
+                                      </a:rPr>
+                                    </m:ctrlPr>
+                                  </m:sSupPr>
+                                  <m:e>
+                                    <m:r>
+                                      <a:rPr lang="en-GB" sz="2400" i="1">
+                                        <a:latin typeface="Cambria Math" panose="02040503050406030204" pitchFamily="18" charset="0"/>
+                                      </a:rPr>
+                                      <m:t>𝜌</m:t>
+                                    </m:r>
+                                  </m:e>
+                                  <m:sup>
+                                    <m:r>
+                                      <a:rPr lang="en-US" sz="2400" b="0" i="1" smtClean="0">
+                                        <a:latin typeface="Cambria Math" panose="02040503050406030204" pitchFamily="18" charset="0"/>
+                                      </a:rPr>
+                                      <m:t>𝑇</m:t>
+                                    </m:r>
+                                    <m:r>
+                                      <a:rPr lang="en-GB" sz="2400" i="0">
+                                        <a:latin typeface="Cambria Math" panose="02040503050406030204" pitchFamily="18" charset="0"/>
+                                      </a:rPr>
+                                      <m:t>−1</m:t>
+                                    </m:r>
+                                  </m:sup>
+                                </m:sSup>
+                              </m:e>
+                              <m:e>
+                                <m:sSup>
+                                  <m:sSupPr>
+                                    <m:ctrlPr>
+                                      <a:rPr lang="en-GB" sz="2400" i="1">
+                                        <a:latin typeface="Cambria Math" panose="02040503050406030204" pitchFamily="18" charset="0"/>
+                                      </a:rPr>
+                                    </m:ctrlPr>
+                                  </m:sSupPr>
+                                  <m:e>
+                                    <m:r>
+                                      <a:rPr lang="en-GB" sz="2400" i="1">
+                                        <a:latin typeface="Cambria Math" panose="02040503050406030204" pitchFamily="18" charset="0"/>
+                                      </a:rPr>
+                                      <m:t>𝜌</m:t>
+                                    </m:r>
+                                  </m:e>
+                                  <m:sup>
+                                    <m:r>
+                                      <a:rPr lang="en-US" sz="2400" b="0" i="1" smtClean="0">
+                                        <a:latin typeface="Cambria Math" panose="02040503050406030204" pitchFamily="18" charset="0"/>
+                                      </a:rPr>
+                                      <m:t>𝑇</m:t>
+                                    </m:r>
+                                    <m:r>
+                                      <a:rPr lang="en-GB" sz="2400" i="0">
+                                        <a:latin typeface="Cambria Math" panose="02040503050406030204" pitchFamily="18" charset="0"/>
+                                      </a:rPr>
+                                      <m:t>−2</m:t>
+                                    </m:r>
+                                  </m:sup>
+                                </m:sSup>
+                              </m:e>
+                              <m:e>
+                                <m:sSup>
+                                  <m:sSupPr>
+                                    <m:ctrlPr>
+                                      <a:rPr lang="en-GB" sz="2400" i="1">
+                                        <a:latin typeface="Cambria Math" panose="02040503050406030204" pitchFamily="18" charset="0"/>
+                                      </a:rPr>
+                                    </m:ctrlPr>
+                                  </m:sSupPr>
+                                  <m:e>
+                                    <m:r>
+                                      <a:rPr lang="en-GB" sz="2400" i="1">
+                                        <a:latin typeface="Cambria Math" panose="02040503050406030204" pitchFamily="18" charset="0"/>
+                                      </a:rPr>
+                                      <m:t>𝜌</m:t>
+                                    </m:r>
+                                  </m:e>
+                                  <m:sup>
+                                    <m:r>
+                                      <a:rPr lang="en-US" sz="2400" b="0" i="1" smtClean="0">
+                                        <a:latin typeface="Cambria Math" panose="02040503050406030204" pitchFamily="18" charset="0"/>
+                                      </a:rPr>
+                                      <m:t>𝑇</m:t>
+                                    </m:r>
+                                    <m:r>
+                                      <a:rPr lang="en-GB" sz="2400" i="0">
+                                        <a:latin typeface="Cambria Math" panose="02040503050406030204" pitchFamily="18" charset="0"/>
+                                      </a:rPr>
+                                      <m:t>−3</m:t>
+                                    </m:r>
+                                  </m:sup>
+                                </m:sSup>
+                              </m:e>
+                              <m:e>
+                                <m:r>
+                                  <a:rPr lang="en-GB" sz="2400" i="0">
+                                    <a:latin typeface="Cambria Math" panose="02040503050406030204" pitchFamily="18" charset="0"/>
+                                  </a:rPr>
+                                  <m:t>...</m:t>
+                                </m:r>
+                              </m:e>
+                              <m:e>
+                                <m:r>
+                                  <a:rPr lang="en-GB" sz="2400" i="0">
+                                    <a:latin typeface="Cambria Math" panose="02040503050406030204" pitchFamily="18" charset="0"/>
+                                  </a:rPr>
+                                  <m:t>1</m:t>
+                                </m:r>
+                              </m:e>
+                            </m:mr>
+                          </m:m>
+                        </m:e>
+                      </m:d>
+                    </m:oMath>
+                  </m:oMathPara>
+                </a14:m>
+                <a:endParaRPr lang="en-GB" dirty="0"/>
+              </a:p>
+            </p:txBody>
+          </p:sp>
+        </mc:Choice>
+        <mc:Fallback xmlns="">
+          <p:sp>
+            <p:nvSpPr>
+              <p:cNvPr id="4" name="Rectangle 3"/>
+              <p:cNvSpPr>
+                <a:spLocks noRot="1" noChangeAspect="1" noMove="1" noResize="1" noEditPoints="1" noAdjustHandles="1" noChangeArrowheads="1" noChangeShapeType="1" noTextEdit="1"/>
+              </p:cNvSpPr>
+              <p:nvPr/>
+            </p:nvSpPr>
+            <p:spPr>
+              <a:xfrm>
+                <a:off x="2060880" y="4206475"/>
+                <a:ext cx="5221686" cy="2015103"/>
+              </a:xfrm>
+              <a:prstGeom prst="rect">
+                <a:avLst/>
+              </a:prstGeom>
+              <a:blipFill>
+                <a:blip r:embed="rId3"/>
+                <a:stretch>
+                  <a:fillRect/>
+                </a:stretch>
+              </a:blipFill>
+            </p:spPr>
+            <p:txBody>
+              <a:bodyPr/>
+              <a:lstStyle/>
+              <a:p>
+                <a:r>
+                  <a:rPr lang="en-GB">
+                    <a:noFill/>
+                  </a:rPr>
+                  <a:t> </a:t>
+                </a:r>
+              </a:p>
+            </p:txBody>
+          </p:sp>
+        </mc:Fallback>
+      </mc:AlternateContent>
+    </p:spTree>
+    <p:extLst>
+      <p:ext uri="{BB962C8B-B14F-4D97-AF65-F5344CB8AC3E}">
+        <p14:creationId xmlns:p14="http://schemas.microsoft.com/office/powerpoint/2010/main" val="811814602"/>
+      </p:ext>
+    </p:extLst>
+  </p:cSld>
+  <p:clrMapOvr>
+    <a:masterClrMapping/>
+  </p:clrMapOvr>
+  <p:timing>
+    <p:tnLst>
+      <p:par>
+        <p:cTn id="1" dur="indefinite" restart="never" nodeType="tmRoot"/>
+      </p:par>
+    </p:tnLst>
+  </p:timing>
+</p:sld>
+</file>
+
+<file path=ppt/slides/slide11.xml><?xml version="1.0" encoding="utf-8"?>
+<p:sld xmlns:a="http://schemas.openxmlformats.org/drawingml/2006/main" xmlns:r="http://schemas.openxmlformats.org/officeDocument/2006/relationships" xmlns:p="http://schemas.openxmlformats.org/presentationml/2006/main">
+  <p:cSld>
+    <p:spTree>
+      <p:nvGrpSpPr>
+        <p:cNvPr id="1" name=""/>
+        <p:cNvGrpSpPr/>
+        <p:nvPr/>
+      </p:nvGrpSpPr>
+      <p:grpSpPr>
+        <a:xfrm>
+          <a:off x="0" y="0"/>
+          <a:ext cx="0" cy="0"/>
+          <a:chOff x="0" y="0"/>
+          <a:chExt cx="0" cy="0"/>
+        </a:xfrm>
+      </p:grpSpPr>
+      <p:sp>
+        <p:nvSpPr>
+          <p:cNvPr id="2" name="Title 1"/>
+          <p:cNvSpPr>
+            <a:spLocks noGrp="1"/>
+          </p:cNvSpPr>
+          <p:nvPr>
+            <p:ph type="title"/>
+          </p:nvPr>
+        </p:nvSpPr>
+        <p:spPr/>
+        <p:txBody>
+          <a:bodyPr/>
+          <a:lstStyle/>
+          <a:p>
+            <a:endParaRPr lang="en-GB"/>
+          </a:p>
+        </p:txBody>
+      </p:sp>
+      <mc:AlternateContent xmlns:mc="http://schemas.openxmlformats.org/markup-compatibility/2006" xmlns:a14="http://schemas.microsoft.com/office/drawing/2010/main">
+        <mc:Choice Requires="a14">
+          <p:sp>
+            <p:nvSpPr>
+              <p:cNvPr id="3" name="Content Placeholder 2"/>
+              <p:cNvSpPr>
+                <a:spLocks noGrp="1"/>
+              </p:cNvSpPr>
+              <p:nvPr>
+                <p:ph idx="1"/>
+              </p:nvPr>
+            </p:nvSpPr>
+            <p:spPr/>
+            <p:txBody>
+              <a:bodyPr>
+                <a:normAutofit/>
+              </a:bodyPr>
+              <a:lstStyle/>
+              <a:p>
+                <a:pPr marL="0" indent="0">
+                  <a:buNone/>
+                </a:pPr>
+                <a:r>
                   <a:rPr lang="en-US" b="1" dirty="0" smtClean="0"/>
                   <a:t>Spatial Gompertz model</a:t>
                 </a:r>
@@ -3607,11 +5039,7 @@
                 </a:pPr>
                 <a:r>
                   <a:rPr lang="en-US" dirty="0" smtClean="0"/>
-                  <a:t>Innovations </a:t>
-                </a:r>
-                <a:r>
-                  <a:rPr lang="en-US" dirty="0" smtClean="0"/>
-                  <a:t>parameterization</a:t>
+                  <a:t>Innovations parameterization</a:t>
                 </a:r>
               </a:p>
               <a:p>
@@ -4035,7 +5463,6 @@
                   <a:rPr lang="en-US" dirty="0" smtClean="0"/>
                   <a:t>2.  Calculate resulting density</a:t>
                 </a:r>
-                <a:endParaRPr lang="en-US" dirty="0" smtClean="0"/>
               </a:p>
               <a:p>
                 <a:pPr marL="0" indent="0">
@@ -4569,7 +5996,7 @@
             </p:txBody>
           </p:sp>
         </mc:Choice>
-        <mc:Fallback>
+        <mc:Fallback xmlns="">
           <p:sp>
             <p:nvSpPr>
               <p:cNvPr id="3" name="Content Placeholder 2"/>
@@ -4623,7 +6050,7 @@
 </p:sld>
 </file>
 
-<file path=ppt/slides/slide11.xml><?xml version="1.0" encoding="utf-8"?>
+<file path=ppt/slides/slide12.xml><?xml version="1.0" encoding="utf-8"?>
 <p:sld xmlns:a="http://schemas.openxmlformats.org/drawingml/2006/main" xmlns:r="http://schemas.openxmlformats.org/officeDocument/2006/relationships" xmlns:p="http://schemas.openxmlformats.org/presentationml/2006/main">
   <p:cSld>
     <p:spTree>
@@ -4793,13 +6220,8 @@
                 </a14:m>
                 <a:r>
                   <a:rPr lang="en-GB" dirty="0"/>
-                  <a:t> as random </a:t>
+                  <a:t> as random effects</a:t>
                 </a:r>
-                <a:r>
-                  <a:rPr lang="en-GB" dirty="0"/>
-                  <a:t>effects</a:t>
-                </a:r>
-                <a:endParaRPr lang="en-GB" dirty="0"/>
               </a:p>
               <a:p>
                 <a:pPr marL="0" indent="0">
@@ -4816,7 +6238,6 @@
                   <a:rPr lang="en-US" dirty="0" smtClean="0"/>
                   <a:t>Calculate predicted density</a:t>
                 </a:r>
-                <a:endParaRPr lang="en-US" dirty="0" smtClean="0"/>
               </a:p>
               <a:p>
                 <a:pPr marL="457200" lvl="1" indent="0">
@@ -5265,7 +6686,14 @@
                     <a:latin typeface="Cambria Math" panose="02040503050406030204" pitchFamily="18" charset="0"/>
                     <a:ea typeface="Cambria Math" panose="02040503050406030204" pitchFamily="18" charset="0"/>
                   </a:rPr>
-                  <a:t>Calculate probability of random effects</a:t>
+                  <a:t>Calculate </a:t>
+                </a:r>
+                <a:r>
+                  <a:rPr lang="en-US" b="0" i="0" dirty="0" smtClean="0">
+                    <a:latin typeface="Cambria Math" panose="02040503050406030204" pitchFamily="18" charset="0"/>
+                    <a:ea typeface="Cambria Math" panose="02040503050406030204" pitchFamily="18" charset="0"/>
+                  </a:rPr>
+                  <a:t>probability of random effects</a:t>
                 </a:r>
               </a:p>
               <a:p>
@@ -5687,7 +7115,1244 @@
 </p:sld>
 </file>
 
-<file path=ppt/slides/slide12.xml><?xml version="1.0" encoding="utf-8"?>
+<file path=ppt/slides/slide13.xml><?xml version="1.0" encoding="utf-8"?>
+<p:sld xmlns:a="http://schemas.openxmlformats.org/drawingml/2006/main" xmlns:r="http://schemas.openxmlformats.org/officeDocument/2006/relationships" xmlns:p="http://schemas.openxmlformats.org/presentationml/2006/main">
+  <p:cSld>
+    <p:spTree>
+      <p:nvGrpSpPr>
+        <p:cNvPr id="1" name=""/>
+        <p:cNvGrpSpPr/>
+        <p:nvPr/>
+      </p:nvGrpSpPr>
+      <p:grpSpPr>
+        <a:xfrm>
+          <a:off x="0" y="0"/>
+          <a:ext cx="0" cy="0"/>
+          <a:chOff x="0" y="0"/>
+          <a:chExt cx="0" cy="0"/>
+        </a:xfrm>
+      </p:grpSpPr>
+      <p:sp>
+        <p:nvSpPr>
+          <p:cNvPr id="2" name="Title 1"/>
+          <p:cNvSpPr>
+            <a:spLocks noGrp="1"/>
+          </p:cNvSpPr>
+          <p:nvPr>
+            <p:ph type="title"/>
+          </p:nvPr>
+        </p:nvSpPr>
+        <p:spPr/>
+        <p:txBody>
+          <a:bodyPr/>
+          <a:lstStyle/>
+          <a:p>
+            <a:endParaRPr lang="en-GB"/>
+          </a:p>
+        </p:txBody>
+      </p:sp>
+      <mc:AlternateContent xmlns:mc="http://schemas.openxmlformats.org/markup-compatibility/2006">
+        <mc:Choice xmlns:a14="http://schemas.microsoft.com/office/drawing/2010/main" Requires="a14">
+          <p:sp>
+            <p:nvSpPr>
+              <p:cNvPr id="3" name="Content Placeholder 2"/>
+              <p:cNvSpPr>
+                <a:spLocks noGrp="1"/>
+              </p:cNvSpPr>
+              <p:nvPr>
+                <p:ph idx="1"/>
+              </p:nvPr>
+            </p:nvSpPr>
+            <p:spPr/>
+            <p:txBody>
+              <a:bodyPr>
+                <a:normAutofit fontScale="92500" lnSpcReduction="20000"/>
+              </a:bodyPr>
+              <a:lstStyle/>
+              <a:p>
+                <a:pPr marL="0" indent="0">
+                  <a:buNone/>
+                </a:pPr>
+                <a:r>
+                  <a:rPr lang="en-US" b="1" dirty="0" smtClean="0"/>
+                  <a:t>Spatial Gompertz model</a:t>
+                </a:r>
+                <a:r>
+                  <a:rPr lang="en-US" dirty="0" smtClean="0"/>
+                  <a:t>:</a:t>
+                </a:r>
+              </a:p>
+              <a:p>
+                <a:pPr marL="0" indent="0">
+                  <a:buNone/>
+                </a:pPr>
+                <a:r>
+                  <a:rPr lang="en-US" dirty="0" smtClean="0"/>
+                  <a:t>State-space </a:t>
+                </a:r>
+                <a:r>
+                  <a:rPr lang="en-US" dirty="0" smtClean="0"/>
+                  <a:t>parameterization (2</a:t>
+                </a:r>
+                <a:r>
+                  <a:rPr lang="en-US" baseline="30000" dirty="0" smtClean="0"/>
+                  <a:t>nd</a:t>
+                </a:r>
+                <a:r>
+                  <a:rPr lang="en-US" dirty="0" smtClean="0"/>
+                  <a:t> version)</a:t>
+                </a:r>
+                <a:endParaRPr lang="en-US" dirty="0" smtClean="0"/>
+              </a:p>
+              <a:p>
+                <a:r>
+                  <a:rPr lang="en-US" dirty="0"/>
+                  <a:t>Estimate </a:t>
+                </a:r>
+                <a14:m>
+                  <m:oMath xmlns:m="http://schemas.openxmlformats.org/officeDocument/2006/math">
+                    <m:sSub>
+                      <m:sSubPr>
+                        <m:ctrlPr>
+                          <a:rPr lang="en-US" i="1">
+                            <a:latin typeface="Cambria Math" panose="02040503050406030204" pitchFamily="18" charset="0"/>
+                            <a:ea typeface="Cambria Math" panose="02040503050406030204" pitchFamily="18" charset="0"/>
+                          </a:rPr>
+                        </m:ctrlPr>
+                      </m:sSubPr>
+                      <m:e>
+                        <m:r>
+                          <a:rPr lang="en-US" b="0" i="1" smtClean="0">
+                            <a:latin typeface="Cambria Math" panose="02040503050406030204" pitchFamily="18" charset="0"/>
+                            <a:ea typeface="Cambria Math" panose="02040503050406030204" pitchFamily="18" charset="0"/>
+                          </a:rPr>
+                          <m:t>𝑑</m:t>
+                        </m:r>
+                      </m:e>
+                      <m:sub>
+                        <m:r>
+                          <a:rPr lang="en-US" i="1">
+                            <a:latin typeface="Cambria Math" panose="02040503050406030204" pitchFamily="18" charset="0"/>
+                            <a:ea typeface="Cambria Math" panose="02040503050406030204" pitchFamily="18" charset="0"/>
+                          </a:rPr>
+                          <m:t>𝑡</m:t>
+                        </m:r>
+                      </m:sub>
+                    </m:sSub>
+                    <m:d>
+                      <m:dPr>
+                        <m:ctrlPr>
+                          <a:rPr lang="en-US" i="1">
+                            <a:latin typeface="Cambria Math" panose="02040503050406030204" pitchFamily="18" charset="0"/>
+                            <a:ea typeface="Cambria Math" panose="02040503050406030204" pitchFamily="18" charset="0"/>
+                          </a:rPr>
+                        </m:ctrlPr>
+                      </m:dPr>
+                      <m:e>
+                        <m:r>
+                          <a:rPr lang="en-US" i="1">
+                            <a:latin typeface="Cambria Math" panose="02040503050406030204" pitchFamily="18" charset="0"/>
+                            <a:ea typeface="Cambria Math" panose="02040503050406030204" pitchFamily="18" charset="0"/>
+                          </a:rPr>
+                          <m:t>𝑠</m:t>
+                        </m:r>
+                      </m:e>
+                    </m:d>
+                  </m:oMath>
+                </a14:m>
+                <a:r>
+                  <a:rPr lang="en-GB" dirty="0"/>
+                  <a:t> and </a:t>
+                </a:r>
+                <a14:m>
+                  <m:oMath xmlns:m="http://schemas.openxmlformats.org/officeDocument/2006/math">
+                    <m:r>
+                      <a:rPr lang="en-US" i="1">
+                        <a:latin typeface="Cambria Math" panose="02040503050406030204" pitchFamily="18" charset="0"/>
+                        <a:ea typeface="Cambria Math" panose="02040503050406030204" pitchFamily="18" charset="0"/>
+                      </a:rPr>
+                      <m:t>𝜔</m:t>
+                    </m:r>
+                    <m:r>
+                      <a:rPr lang="en-US" i="1">
+                        <a:latin typeface="Cambria Math" panose="02040503050406030204" pitchFamily="18" charset="0"/>
+                        <a:ea typeface="Cambria Math" panose="02040503050406030204" pitchFamily="18" charset="0"/>
+                      </a:rPr>
+                      <m:t>(</m:t>
+                    </m:r>
+                    <m:r>
+                      <a:rPr lang="en-US" i="1">
+                        <a:latin typeface="Cambria Math" panose="02040503050406030204" pitchFamily="18" charset="0"/>
+                        <a:ea typeface="Cambria Math" panose="02040503050406030204" pitchFamily="18" charset="0"/>
+                      </a:rPr>
+                      <m:t>𝑠</m:t>
+                    </m:r>
+                    <m:r>
+                      <a:rPr lang="en-US" i="1">
+                        <a:latin typeface="Cambria Math" panose="02040503050406030204" pitchFamily="18" charset="0"/>
+                        <a:ea typeface="Cambria Math" panose="02040503050406030204" pitchFamily="18" charset="0"/>
+                      </a:rPr>
+                      <m:t>)</m:t>
+                    </m:r>
+                  </m:oMath>
+                </a14:m>
+                <a:r>
+                  <a:rPr lang="en-GB" dirty="0"/>
+                  <a:t> as random effects</a:t>
+                </a:r>
+              </a:p>
+              <a:p>
+                <a:pPr marL="0" indent="0">
+                  <a:buNone/>
+                </a:pPr>
+                <a:endParaRPr lang="en-US" dirty="0" smtClean="0"/>
+              </a:p>
+              <a:p>
+                <a:pPr marL="514350" indent="-514350">
+                  <a:buFont typeface="+mj-lt"/>
+                  <a:buAutoNum type="arabicPeriod"/>
+                </a:pPr>
+                <a:r>
+                  <a:rPr lang="en-US" dirty="0" smtClean="0"/>
+                  <a:t>Calculate predicted density</a:t>
+                </a:r>
+              </a:p>
+              <a:p>
+                <a:pPr marL="457200" lvl="1" indent="0">
+                  <a:buNone/>
+                </a:pPr>
+                <a14:m>
+                  <m:oMathPara xmlns:m="http://schemas.openxmlformats.org/officeDocument/2006/math">
+                    <m:oMathParaPr>
+                      <m:jc m:val="centerGroup"/>
+                    </m:oMathParaPr>
+                    <m:oMath xmlns:m="http://schemas.openxmlformats.org/officeDocument/2006/math">
+                      <m:r>
+                        <m:rPr>
+                          <m:sty m:val="p"/>
+                        </m:rPr>
+                        <a:rPr lang="en-US" b="0" i="0" smtClean="0">
+                          <a:latin typeface="Cambria Math" panose="02040503050406030204" pitchFamily="18" charset="0"/>
+                          <a:ea typeface="Cambria Math" panose="02040503050406030204" pitchFamily="18" charset="0"/>
+                        </a:rPr>
+                        <m:t>log</m:t>
+                      </m:r>
+                      <m:r>
+                        <a:rPr lang="en-US" b="0" i="1" smtClean="0">
+                          <a:latin typeface="Cambria Math" panose="02040503050406030204" pitchFamily="18" charset="0"/>
+                          <a:ea typeface="Cambria Math" panose="02040503050406030204" pitchFamily="18" charset="0"/>
+                        </a:rPr>
+                        <m:t>⁡</m:t>
+                      </m:r>
+                      <m:d>
+                        <m:dPr>
+                          <m:ctrlPr>
+                            <a:rPr lang="en-US" b="0" i="1" smtClean="0">
+                              <a:latin typeface="Cambria Math" panose="02040503050406030204" pitchFamily="18" charset="0"/>
+                              <a:ea typeface="Cambria Math" panose="02040503050406030204" pitchFamily="18" charset="0"/>
+                            </a:rPr>
+                          </m:ctrlPr>
+                        </m:dPr>
+                        <m:e>
+                          <m:sSubSup>
+                            <m:sSubSupPr>
+                              <m:ctrlPr>
+                                <a:rPr lang="en-US" i="1">
+                                  <a:latin typeface="Cambria Math" panose="02040503050406030204" pitchFamily="18" charset="0"/>
+                                  <a:ea typeface="Cambria Math" panose="02040503050406030204" pitchFamily="18" charset="0"/>
+                                </a:rPr>
+                              </m:ctrlPr>
+                            </m:sSubSupPr>
+                            <m:e>
+                              <m:r>
+                                <a:rPr lang="en-US" i="1">
+                                  <a:latin typeface="Cambria Math" panose="02040503050406030204" pitchFamily="18" charset="0"/>
+                                  <a:ea typeface="Cambria Math" panose="02040503050406030204" pitchFamily="18" charset="0"/>
+                                </a:rPr>
+                                <m:t>𝑑</m:t>
+                              </m:r>
+                            </m:e>
+                            <m:sub>
+                              <m:r>
+                                <a:rPr lang="en-US" i="1">
+                                  <a:latin typeface="Cambria Math" panose="02040503050406030204" pitchFamily="18" charset="0"/>
+                                  <a:ea typeface="Cambria Math" panose="02040503050406030204" pitchFamily="18" charset="0"/>
+                                </a:rPr>
+                                <m:t>𝑡</m:t>
+                              </m:r>
+                            </m:sub>
+                            <m:sup>
+                              <m:r>
+                                <a:rPr lang="en-US" i="1">
+                                  <a:latin typeface="Cambria Math" panose="02040503050406030204" pitchFamily="18" charset="0"/>
+                                  <a:ea typeface="Cambria Math" panose="02040503050406030204" pitchFamily="18" charset="0"/>
+                                </a:rPr>
+                                <m:t>∗</m:t>
+                              </m:r>
+                            </m:sup>
+                          </m:sSubSup>
+                          <m:r>
+                            <a:rPr lang="en-US" i="1">
+                              <a:latin typeface="Cambria Math" panose="02040503050406030204" pitchFamily="18" charset="0"/>
+                              <a:ea typeface="Cambria Math" panose="02040503050406030204" pitchFamily="18" charset="0"/>
+                            </a:rPr>
+                            <m:t>(</m:t>
+                          </m:r>
+                          <m:r>
+                            <a:rPr lang="en-US" i="1">
+                              <a:latin typeface="Cambria Math" panose="02040503050406030204" pitchFamily="18" charset="0"/>
+                              <a:ea typeface="Cambria Math" panose="02040503050406030204" pitchFamily="18" charset="0"/>
+                            </a:rPr>
+                            <m:t>𝑠</m:t>
+                          </m:r>
+                          <m:r>
+                            <a:rPr lang="en-US" i="1">
+                              <a:latin typeface="Cambria Math" panose="02040503050406030204" pitchFamily="18" charset="0"/>
+                              <a:ea typeface="Cambria Math" panose="02040503050406030204" pitchFamily="18" charset="0"/>
+                            </a:rPr>
+                            <m:t>)</m:t>
+                          </m:r>
+                        </m:e>
+                      </m:d>
+                      <m:r>
+                        <a:rPr lang="en-US" b="0" i="1" smtClean="0">
+                          <a:latin typeface="Cambria Math" panose="02040503050406030204" pitchFamily="18" charset="0"/>
+                          <a:ea typeface="Cambria Math" panose="02040503050406030204" pitchFamily="18" charset="0"/>
+                        </a:rPr>
+                        <m:t>=</m:t>
+                      </m:r>
+                      <m:d>
+                        <m:dPr>
+                          <m:begChr m:val="{"/>
+                          <m:endChr m:val=""/>
+                          <m:ctrlPr>
+                            <a:rPr lang="en-US" b="0" i="1" smtClean="0">
+                              <a:latin typeface="Cambria Math" panose="02040503050406030204" pitchFamily="18" charset="0"/>
+                              <a:ea typeface="Cambria Math" panose="02040503050406030204" pitchFamily="18" charset="0"/>
+                            </a:rPr>
+                          </m:ctrlPr>
+                        </m:dPr>
+                        <m:e>
+                          <m:m>
+                            <m:mPr>
+                              <m:mcs>
+                                <m:mc>
+                                  <m:mcPr>
+                                    <m:count m:val="2"/>
+                                    <m:mcJc m:val="center"/>
+                                  </m:mcPr>
+                                </m:mc>
+                              </m:mcs>
+                              <m:ctrlPr>
+                                <a:rPr lang="en-US" b="0" i="1" smtClean="0">
+                                  <a:latin typeface="Cambria Math" panose="02040503050406030204" pitchFamily="18" charset="0"/>
+                                  <a:ea typeface="Cambria Math" panose="02040503050406030204" pitchFamily="18" charset="0"/>
+                                </a:rPr>
+                              </m:ctrlPr>
+                            </m:mPr>
+                            <m:mr>
+                              <m:e>
+                                <m:r>
+                                  <m:rPr>
+                                    <m:brk m:alnAt="7"/>
+                                  </m:rPr>
+                                  <a:rPr lang="en-US" b="0" i="1" smtClean="0">
+                                    <a:latin typeface="Cambria Math" panose="02040503050406030204" pitchFamily="18" charset="0"/>
+                                    <a:ea typeface="Cambria Math" panose="02040503050406030204" pitchFamily="18" charset="0"/>
+                                  </a:rPr>
+                                  <m:t>𝜑</m:t>
+                                </m:r>
+                                <m:r>
+                                  <a:rPr lang="en-US" b="0" i="1" smtClean="0">
+                                    <a:latin typeface="Cambria Math" panose="02040503050406030204" pitchFamily="18" charset="0"/>
+                                    <a:ea typeface="Cambria Math" panose="02040503050406030204" pitchFamily="18" charset="0"/>
+                                  </a:rPr>
+                                  <m:t>+</m:t>
+                                </m:r>
+                                <m:f>
+                                  <m:fPr>
+                                    <m:ctrlPr>
+                                      <a:rPr lang="en-US" b="0" i="1" smtClean="0">
+                                        <a:latin typeface="Cambria Math" panose="02040503050406030204" pitchFamily="18" charset="0"/>
+                                        <a:ea typeface="Cambria Math" panose="02040503050406030204" pitchFamily="18" charset="0"/>
+                                      </a:rPr>
+                                    </m:ctrlPr>
+                                  </m:fPr>
+                                  <m:num>
+                                    <m:r>
+                                      <a:rPr lang="en-US" i="1">
+                                        <a:latin typeface="Cambria Math" panose="02040503050406030204" pitchFamily="18" charset="0"/>
+                                        <a:ea typeface="Cambria Math" panose="02040503050406030204" pitchFamily="18" charset="0"/>
+                                      </a:rPr>
+                                      <m:t>𝛼</m:t>
+                                    </m:r>
+                                    <m:r>
+                                      <a:rPr lang="en-US" i="1">
+                                        <a:latin typeface="Cambria Math" panose="02040503050406030204" pitchFamily="18" charset="0"/>
+                                        <a:ea typeface="Cambria Math" panose="02040503050406030204" pitchFamily="18" charset="0"/>
+                                      </a:rPr>
+                                      <m:t>+</m:t>
+                                    </m:r>
+                                    <m:r>
+                                      <a:rPr lang="en-US" i="1">
+                                        <a:latin typeface="Cambria Math" panose="02040503050406030204" pitchFamily="18" charset="0"/>
+                                        <a:ea typeface="Cambria Math" panose="02040503050406030204" pitchFamily="18" charset="0"/>
+                                      </a:rPr>
+                                      <m:t>𝜔</m:t>
+                                    </m:r>
+                                    <m:d>
+                                      <m:dPr>
+                                        <m:ctrlPr>
+                                          <a:rPr lang="en-US" i="1">
+                                            <a:latin typeface="Cambria Math" panose="02040503050406030204" pitchFamily="18" charset="0"/>
+                                            <a:ea typeface="Cambria Math" panose="02040503050406030204" pitchFamily="18" charset="0"/>
+                                          </a:rPr>
+                                        </m:ctrlPr>
+                                      </m:dPr>
+                                      <m:e>
+                                        <m:r>
+                                          <a:rPr lang="en-US" i="1">
+                                            <a:latin typeface="Cambria Math" panose="02040503050406030204" pitchFamily="18" charset="0"/>
+                                            <a:ea typeface="Cambria Math" panose="02040503050406030204" pitchFamily="18" charset="0"/>
+                                          </a:rPr>
+                                          <m:t>𝑠</m:t>
+                                        </m:r>
+                                      </m:e>
+                                    </m:d>
+                                  </m:num>
+                                  <m:den>
+                                    <m:r>
+                                      <a:rPr lang="en-US" b="0" i="1" smtClean="0">
+                                        <a:latin typeface="Cambria Math" panose="02040503050406030204" pitchFamily="18" charset="0"/>
+                                        <a:ea typeface="Cambria Math" panose="02040503050406030204" pitchFamily="18" charset="0"/>
+                                      </a:rPr>
+                                      <m:t>1−</m:t>
+                                    </m:r>
+                                    <m:r>
+                                      <a:rPr lang="en-US" b="0" i="1" smtClean="0">
+                                        <a:latin typeface="Cambria Math" panose="02040503050406030204" pitchFamily="18" charset="0"/>
+                                        <a:ea typeface="Cambria Math" panose="02040503050406030204" pitchFamily="18" charset="0"/>
+                                      </a:rPr>
+                                      <m:t>𝜌</m:t>
+                                    </m:r>
+                                  </m:den>
+                                </m:f>
+                              </m:e>
+                              <m:e>
+                                <m:r>
+                                  <m:rPr>
+                                    <m:sty m:val="p"/>
+                                  </m:rPr>
+                                  <a:rPr lang="en-US" b="0" i="0" smtClean="0">
+                                    <a:latin typeface="Cambria Math" panose="02040503050406030204" pitchFamily="18" charset="0"/>
+                                    <a:ea typeface="Cambria Math" panose="02040503050406030204" pitchFamily="18" charset="0"/>
+                                  </a:rPr>
+                                  <m:t>if</m:t>
+                                </m:r>
+                                <m:r>
+                                  <a:rPr lang="en-US" b="0" i="0" smtClean="0">
+                                    <a:latin typeface="Cambria Math" panose="02040503050406030204" pitchFamily="18" charset="0"/>
+                                    <a:ea typeface="Cambria Math" panose="02040503050406030204" pitchFamily="18" charset="0"/>
+                                  </a:rPr>
+                                  <m:t> </m:t>
+                                </m:r>
+                                <m:r>
+                                  <a:rPr lang="en-US" b="0" i="1" smtClean="0">
+                                    <a:latin typeface="Cambria Math" panose="02040503050406030204" pitchFamily="18" charset="0"/>
+                                    <a:ea typeface="Cambria Math" panose="02040503050406030204" pitchFamily="18" charset="0"/>
+                                  </a:rPr>
+                                  <m:t>𝑡</m:t>
+                                </m:r>
+                                <m:r>
+                                  <a:rPr lang="en-US" b="0" i="1" smtClean="0">
+                                    <a:latin typeface="Cambria Math" panose="02040503050406030204" pitchFamily="18" charset="0"/>
+                                    <a:ea typeface="Cambria Math" panose="02040503050406030204" pitchFamily="18" charset="0"/>
+                                  </a:rPr>
+                                  <m:t>=1</m:t>
+                                </m:r>
+                              </m:e>
+                            </m:mr>
+                            <m:mr>
+                              <m:e>
+                                <m:r>
+                                  <a:rPr lang="en-US" i="1">
+                                    <a:latin typeface="Cambria Math" panose="02040503050406030204" pitchFamily="18" charset="0"/>
+                                    <a:ea typeface="Cambria Math" panose="02040503050406030204" pitchFamily="18" charset="0"/>
+                                  </a:rPr>
+                                  <m:t>𝛼</m:t>
+                                </m:r>
+                                <m:r>
+                                  <a:rPr lang="en-US" i="1">
+                                    <a:latin typeface="Cambria Math" panose="02040503050406030204" pitchFamily="18" charset="0"/>
+                                    <a:ea typeface="Cambria Math" panose="02040503050406030204" pitchFamily="18" charset="0"/>
+                                  </a:rPr>
+                                  <m:t>+</m:t>
+                                </m:r>
+                                <m:r>
+                                  <a:rPr lang="en-US" i="1">
+                                    <a:latin typeface="Cambria Math" panose="02040503050406030204" pitchFamily="18" charset="0"/>
+                                    <a:ea typeface="Cambria Math" panose="02040503050406030204" pitchFamily="18" charset="0"/>
+                                  </a:rPr>
+                                  <m:t>𝜔</m:t>
+                                </m:r>
+                                <m:d>
+                                  <m:dPr>
+                                    <m:ctrlPr>
+                                      <a:rPr lang="en-US" i="1">
+                                        <a:latin typeface="Cambria Math" panose="02040503050406030204" pitchFamily="18" charset="0"/>
+                                        <a:ea typeface="Cambria Math" panose="02040503050406030204" pitchFamily="18" charset="0"/>
+                                      </a:rPr>
+                                    </m:ctrlPr>
+                                  </m:dPr>
+                                  <m:e>
+                                    <m:r>
+                                      <a:rPr lang="en-US" i="1">
+                                        <a:latin typeface="Cambria Math" panose="02040503050406030204" pitchFamily="18" charset="0"/>
+                                        <a:ea typeface="Cambria Math" panose="02040503050406030204" pitchFamily="18" charset="0"/>
+                                      </a:rPr>
+                                      <m:t>𝑠</m:t>
+                                    </m:r>
+                                  </m:e>
+                                </m:d>
+                                <m:r>
+                                  <a:rPr lang="en-US" i="1">
+                                    <a:latin typeface="Cambria Math" panose="02040503050406030204" pitchFamily="18" charset="0"/>
+                                    <a:ea typeface="Cambria Math" panose="02040503050406030204" pitchFamily="18" charset="0"/>
+                                  </a:rPr>
+                                  <m:t>+</m:t>
+                                </m:r>
+                                <m:r>
+                                  <a:rPr lang="en-US" i="1">
+                                    <a:latin typeface="Cambria Math" panose="02040503050406030204" pitchFamily="18" charset="0"/>
+                                    <a:ea typeface="Cambria Math" panose="02040503050406030204" pitchFamily="18" charset="0"/>
+                                  </a:rPr>
+                                  <m:t>𝜌</m:t>
+                                </m:r>
+                                <m:r>
+                                  <m:rPr>
+                                    <m:sty m:val="p"/>
+                                  </m:rPr>
+                                  <a:rPr lang="en-US">
+                                    <a:latin typeface="Cambria Math" panose="02040503050406030204" pitchFamily="18" charset="0"/>
+                                    <a:ea typeface="Cambria Math" panose="02040503050406030204" pitchFamily="18" charset="0"/>
+                                  </a:rPr>
+                                  <m:t>log</m:t>
+                                </m:r>
+                                <m:r>
+                                  <a:rPr lang="en-US" i="1">
+                                    <a:latin typeface="Cambria Math" panose="02040503050406030204" pitchFamily="18" charset="0"/>
+                                    <a:ea typeface="Cambria Math" panose="02040503050406030204" pitchFamily="18" charset="0"/>
+                                  </a:rPr>
+                                  <m:t>⁡</m:t>
+                                </m:r>
+                                <m:d>
+                                  <m:dPr>
+                                    <m:ctrlPr>
+                                      <a:rPr lang="en-US" i="1">
+                                        <a:latin typeface="Cambria Math" panose="02040503050406030204" pitchFamily="18" charset="0"/>
+                                        <a:ea typeface="Cambria Math" panose="02040503050406030204" pitchFamily="18" charset="0"/>
+                                      </a:rPr>
+                                    </m:ctrlPr>
+                                  </m:dPr>
+                                  <m:e>
+                                    <m:sSub>
+                                      <m:sSubPr>
+                                        <m:ctrlPr>
+                                          <a:rPr lang="en-US" i="1">
+                                            <a:latin typeface="Cambria Math" panose="02040503050406030204" pitchFamily="18" charset="0"/>
+                                            <a:ea typeface="Cambria Math" panose="02040503050406030204" pitchFamily="18" charset="0"/>
+                                          </a:rPr>
+                                        </m:ctrlPr>
+                                      </m:sSubPr>
+                                      <m:e>
+                                        <m:r>
+                                          <a:rPr lang="en-US" i="1">
+                                            <a:latin typeface="Cambria Math" panose="02040503050406030204" pitchFamily="18" charset="0"/>
+                                            <a:ea typeface="Cambria Math" panose="02040503050406030204" pitchFamily="18" charset="0"/>
+                                          </a:rPr>
+                                          <m:t>𝑑</m:t>
+                                        </m:r>
+                                      </m:e>
+                                      <m:sub>
+                                        <m:r>
+                                          <a:rPr lang="en-US" i="1">
+                                            <a:latin typeface="Cambria Math" panose="02040503050406030204" pitchFamily="18" charset="0"/>
+                                            <a:ea typeface="Cambria Math" panose="02040503050406030204" pitchFamily="18" charset="0"/>
+                                          </a:rPr>
+                                          <m:t>𝑡</m:t>
+                                        </m:r>
+                                        <m:r>
+                                          <a:rPr lang="en-US" b="0" i="1" smtClean="0">
+                                            <a:latin typeface="Cambria Math" panose="02040503050406030204" pitchFamily="18" charset="0"/>
+                                            <a:ea typeface="Cambria Math" panose="02040503050406030204" pitchFamily="18" charset="0"/>
+                                          </a:rPr>
+                                          <m:t>−1</m:t>
+                                        </m:r>
+                                      </m:sub>
+                                    </m:sSub>
+                                    <m:d>
+                                      <m:dPr>
+                                        <m:ctrlPr>
+                                          <a:rPr lang="en-US" i="1">
+                                            <a:latin typeface="Cambria Math" panose="02040503050406030204" pitchFamily="18" charset="0"/>
+                                            <a:ea typeface="Cambria Math" panose="02040503050406030204" pitchFamily="18" charset="0"/>
+                                          </a:rPr>
+                                        </m:ctrlPr>
+                                      </m:dPr>
+                                      <m:e>
+                                        <m:r>
+                                          <a:rPr lang="en-US" i="1">
+                                            <a:latin typeface="Cambria Math" panose="02040503050406030204" pitchFamily="18" charset="0"/>
+                                            <a:ea typeface="Cambria Math" panose="02040503050406030204" pitchFamily="18" charset="0"/>
+                                          </a:rPr>
+                                          <m:t>𝑠</m:t>
+                                        </m:r>
+                                      </m:e>
+                                    </m:d>
+                                  </m:e>
+                                </m:d>
+                              </m:e>
+                              <m:e>
+                                <m:r>
+                                  <m:rPr>
+                                    <m:sty m:val="p"/>
+                                  </m:rPr>
+                                  <a:rPr lang="en-US" b="0" i="0" smtClean="0">
+                                    <a:latin typeface="Cambria Math" panose="02040503050406030204" pitchFamily="18" charset="0"/>
+                                    <a:ea typeface="Cambria Math" panose="02040503050406030204" pitchFamily="18" charset="0"/>
+                                  </a:rPr>
+                                  <m:t>if</m:t>
+                                </m:r>
+                                <m:r>
+                                  <a:rPr lang="en-US" b="0" i="0" smtClean="0">
+                                    <a:latin typeface="Cambria Math" panose="02040503050406030204" pitchFamily="18" charset="0"/>
+                                    <a:ea typeface="Cambria Math" panose="02040503050406030204" pitchFamily="18" charset="0"/>
+                                  </a:rPr>
+                                  <m:t> </m:t>
+                                </m:r>
+                                <m:r>
+                                  <a:rPr lang="en-US" b="0" i="1" smtClean="0">
+                                    <a:latin typeface="Cambria Math" panose="02040503050406030204" pitchFamily="18" charset="0"/>
+                                    <a:ea typeface="Cambria Math" panose="02040503050406030204" pitchFamily="18" charset="0"/>
+                                  </a:rPr>
+                                  <m:t>𝑡</m:t>
+                                </m:r>
+                                <m:r>
+                                  <a:rPr lang="en-US" b="0" i="1" smtClean="0">
+                                    <a:latin typeface="Cambria Math" panose="02040503050406030204" pitchFamily="18" charset="0"/>
+                                    <a:ea typeface="Cambria Math" panose="02040503050406030204" pitchFamily="18" charset="0"/>
+                                  </a:rPr>
+                                  <m:t>&gt;1</m:t>
+                                </m:r>
+                              </m:e>
+                            </m:mr>
+                          </m:m>
+                        </m:e>
+                      </m:d>
+                    </m:oMath>
+                  </m:oMathPara>
+                </a14:m>
+                <a:endParaRPr lang="en-US" dirty="0" smtClean="0"/>
+              </a:p>
+              <a:p>
+                <a:pPr marL="514350" indent="-457200">
+                  <a:buFont typeface="+mj-lt"/>
+                  <a:buAutoNum type="arabicPeriod"/>
+                </a:pPr>
+                <a:r>
+                  <a:rPr lang="en-US" b="0" dirty="0" smtClean="0">
+                    <a:latin typeface="Cambria Math" panose="02040503050406030204" pitchFamily="18" charset="0"/>
+                    <a:ea typeface="Cambria Math" panose="02040503050406030204" pitchFamily="18" charset="0"/>
+                  </a:rPr>
+                  <a:t>Calculate spatio-temporal variation</a:t>
+                </a:r>
+              </a:p>
+              <a:p>
+                <a:pPr marL="457200" lvl="1" indent="0">
+                  <a:buNone/>
+                </a:pPr>
+                <a14:m>
+                  <m:oMathPara xmlns:m="http://schemas.openxmlformats.org/officeDocument/2006/math">
+                    <m:oMathParaPr>
+                      <m:jc m:val="centerGroup"/>
+                    </m:oMathParaPr>
+                    <m:oMath xmlns:m="http://schemas.openxmlformats.org/officeDocument/2006/math">
+                      <m:sSub>
+                        <m:sSubPr>
+                          <m:ctrlPr>
+                            <a:rPr lang="en-US" b="0" i="1" smtClean="0">
+                              <a:latin typeface="Cambria Math" panose="02040503050406030204" pitchFamily="18" charset="0"/>
+                              <a:ea typeface="Cambria Math" panose="02040503050406030204" pitchFamily="18" charset="0"/>
+                            </a:rPr>
+                          </m:ctrlPr>
+                        </m:sSubPr>
+                        <m:e>
+                          <m:r>
+                            <a:rPr lang="en-US" i="1" smtClean="0">
+                              <a:latin typeface="Cambria Math" panose="02040503050406030204" pitchFamily="18" charset="0"/>
+                              <a:ea typeface="Cambria Math" panose="02040503050406030204" pitchFamily="18" charset="0"/>
+                            </a:rPr>
+                            <m:t>𝜀</m:t>
+                          </m:r>
+                        </m:e>
+                        <m:sub>
+                          <m:r>
+                            <a:rPr lang="en-US" b="0" i="1" smtClean="0">
+                              <a:latin typeface="Cambria Math" panose="02040503050406030204" pitchFamily="18" charset="0"/>
+                              <a:ea typeface="Cambria Math" panose="02040503050406030204" pitchFamily="18" charset="0"/>
+                            </a:rPr>
+                            <m:t>𝑡</m:t>
+                          </m:r>
+                        </m:sub>
+                      </m:sSub>
+                      <m:d>
+                        <m:dPr>
+                          <m:ctrlPr>
+                            <a:rPr lang="en-US" b="0" i="1" smtClean="0">
+                              <a:latin typeface="Cambria Math" panose="02040503050406030204" pitchFamily="18" charset="0"/>
+                              <a:ea typeface="Cambria Math" panose="02040503050406030204" pitchFamily="18" charset="0"/>
+                            </a:rPr>
+                          </m:ctrlPr>
+                        </m:dPr>
+                        <m:e>
+                          <m:r>
+                            <a:rPr lang="en-US" b="0" i="1" smtClean="0">
+                              <a:latin typeface="Cambria Math" panose="02040503050406030204" pitchFamily="18" charset="0"/>
+                              <a:ea typeface="Cambria Math" panose="02040503050406030204" pitchFamily="18" charset="0"/>
+                            </a:rPr>
+                            <m:t>𝑠</m:t>
+                          </m:r>
+                        </m:e>
+                      </m:d>
+                      <m:r>
+                        <a:rPr lang="en-US" b="0" i="1" smtClean="0">
+                          <a:latin typeface="Cambria Math" panose="02040503050406030204" pitchFamily="18" charset="0"/>
+                          <a:ea typeface="Cambria Math" panose="02040503050406030204" pitchFamily="18" charset="0"/>
+                        </a:rPr>
+                        <m:t>=</m:t>
+                      </m:r>
+                      <m:sSub>
+                        <m:sSubPr>
+                          <m:ctrlPr>
+                            <a:rPr lang="en-US" b="0" i="1" smtClean="0">
+                              <a:latin typeface="Cambria Math" panose="02040503050406030204" pitchFamily="18" charset="0"/>
+                              <a:ea typeface="Cambria Math" panose="02040503050406030204" pitchFamily="18" charset="0"/>
+                            </a:rPr>
+                          </m:ctrlPr>
+                        </m:sSubPr>
+                        <m:e>
+                          <m:r>
+                            <a:rPr lang="en-US" b="0" i="1" smtClean="0">
+                              <a:latin typeface="Cambria Math" panose="02040503050406030204" pitchFamily="18" charset="0"/>
+                              <a:ea typeface="Cambria Math" panose="02040503050406030204" pitchFamily="18" charset="0"/>
+                            </a:rPr>
+                            <m:t>𝑑</m:t>
+                          </m:r>
+                        </m:e>
+                        <m:sub>
+                          <m:r>
+                            <a:rPr lang="en-US" b="0" i="1" smtClean="0">
+                              <a:latin typeface="Cambria Math" panose="02040503050406030204" pitchFamily="18" charset="0"/>
+                              <a:ea typeface="Cambria Math" panose="02040503050406030204" pitchFamily="18" charset="0"/>
+                            </a:rPr>
+                            <m:t>𝑡</m:t>
+                          </m:r>
+                        </m:sub>
+                      </m:sSub>
+                      <m:r>
+                        <a:rPr lang="en-US" b="0" i="1" smtClean="0">
+                          <a:latin typeface="Cambria Math" panose="02040503050406030204" pitchFamily="18" charset="0"/>
+                          <a:ea typeface="Cambria Math" panose="02040503050406030204" pitchFamily="18" charset="0"/>
+                        </a:rPr>
+                        <m:t>(</m:t>
+                      </m:r>
+                      <m:r>
+                        <a:rPr lang="en-US" b="0" i="1" smtClean="0">
+                          <a:latin typeface="Cambria Math" panose="02040503050406030204" pitchFamily="18" charset="0"/>
+                          <a:ea typeface="Cambria Math" panose="02040503050406030204" pitchFamily="18" charset="0"/>
+                        </a:rPr>
+                        <m:t>𝑠</m:t>
+                      </m:r>
+                      <m:r>
+                        <a:rPr lang="en-US" b="0" i="1" smtClean="0">
+                          <a:latin typeface="Cambria Math" panose="02040503050406030204" pitchFamily="18" charset="0"/>
+                          <a:ea typeface="Cambria Math" panose="02040503050406030204" pitchFamily="18" charset="0"/>
+                        </a:rPr>
+                        <m:t>)−</m:t>
+                      </m:r>
+                      <m:sSubSup>
+                        <m:sSubSupPr>
+                          <m:ctrlPr>
+                            <a:rPr lang="en-US" b="0" i="1" smtClean="0">
+                              <a:latin typeface="Cambria Math" panose="02040503050406030204" pitchFamily="18" charset="0"/>
+                              <a:ea typeface="Cambria Math" panose="02040503050406030204" pitchFamily="18" charset="0"/>
+                            </a:rPr>
+                          </m:ctrlPr>
+                        </m:sSubSupPr>
+                        <m:e>
+                          <m:r>
+                            <a:rPr lang="en-US" b="0" i="1" smtClean="0">
+                              <a:latin typeface="Cambria Math" panose="02040503050406030204" pitchFamily="18" charset="0"/>
+                              <a:ea typeface="Cambria Math" panose="02040503050406030204" pitchFamily="18" charset="0"/>
+                            </a:rPr>
+                            <m:t>𝑑</m:t>
+                          </m:r>
+                        </m:e>
+                        <m:sub>
+                          <m:r>
+                            <a:rPr lang="en-US" b="0" i="1" smtClean="0">
+                              <a:latin typeface="Cambria Math" panose="02040503050406030204" pitchFamily="18" charset="0"/>
+                              <a:ea typeface="Cambria Math" panose="02040503050406030204" pitchFamily="18" charset="0"/>
+                            </a:rPr>
+                            <m:t>𝑡</m:t>
+                          </m:r>
+                        </m:sub>
+                        <m:sup>
+                          <m:r>
+                            <a:rPr lang="en-US" b="0" i="1" smtClean="0">
+                              <a:latin typeface="Cambria Math" panose="02040503050406030204" pitchFamily="18" charset="0"/>
+                              <a:ea typeface="Cambria Math" panose="02040503050406030204" pitchFamily="18" charset="0"/>
+                            </a:rPr>
+                            <m:t>∗</m:t>
+                          </m:r>
+                        </m:sup>
+                      </m:sSubSup>
+                      <m:r>
+                        <a:rPr lang="en-US" b="0" i="1" smtClean="0">
+                          <a:latin typeface="Cambria Math" panose="02040503050406030204" pitchFamily="18" charset="0"/>
+                          <a:ea typeface="Cambria Math" panose="02040503050406030204" pitchFamily="18" charset="0"/>
+                        </a:rPr>
+                        <m:t>(</m:t>
+                      </m:r>
+                      <m:r>
+                        <a:rPr lang="en-US" b="0" i="1" smtClean="0">
+                          <a:latin typeface="Cambria Math" panose="02040503050406030204" pitchFamily="18" charset="0"/>
+                          <a:ea typeface="Cambria Math" panose="02040503050406030204" pitchFamily="18" charset="0"/>
+                        </a:rPr>
+                        <m:t>𝑠</m:t>
+                      </m:r>
+                      <m:r>
+                        <a:rPr lang="en-US" b="0" i="1" smtClean="0">
+                          <a:latin typeface="Cambria Math" panose="02040503050406030204" pitchFamily="18" charset="0"/>
+                          <a:ea typeface="Cambria Math" panose="02040503050406030204" pitchFamily="18" charset="0"/>
+                        </a:rPr>
+                        <m:t>)</m:t>
+                      </m:r>
+                    </m:oMath>
+                  </m:oMathPara>
+                </a14:m>
+                <a:endParaRPr lang="en-US" dirty="0" smtClean="0"/>
+              </a:p>
+              <a:p>
+                <a:pPr marL="57150" indent="0">
+                  <a:buNone/>
+                </a:pPr>
+                <a:r>
+                  <a:rPr lang="en-US" dirty="0" smtClean="0">
+                    <a:latin typeface="Cambria Math" panose="02040503050406030204" pitchFamily="18" charset="0"/>
+                    <a:ea typeface="Cambria Math" panose="02040503050406030204" pitchFamily="18" charset="0"/>
+                  </a:rPr>
+                  <a:t>3.  </a:t>
+                </a:r>
+                <a:r>
+                  <a:rPr lang="en-US" b="0" i="0" dirty="0" smtClean="0">
+                    <a:latin typeface="Cambria Math" panose="02040503050406030204" pitchFamily="18" charset="0"/>
+                    <a:ea typeface="Cambria Math" panose="02040503050406030204" pitchFamily="18" charset="0"/>
+                  </a:rPr>
+                  <a:t>Calculate </a:t>
+                </a:r>
+                <a:r>
+                  <a:rPr lang="en-US" b="0" i="0" dirty="0" smtClean="0">
+                    <a:latin typeface="Cambria Math" panose="02040503050406030204" pitchFamily="18" charset="0"/>
+                    <a:ea typeface="Cambria Math" panose="02040503050406030204" pitchFamily="18" charset="0"/>
+                  </a:rPr>
+                  <a:t>probability of random </a:t>
+                </a:r>
+                <a:r>
+                  <a:rPr lang="en-US" b="0" i="0" dirty="0" smtClean="0">
+                    <a:latin typeface="Cambria Math" panose="02040503050406030204" pitchFamily="18" charset="0"/>
+                    <a:ea typeface="Cambria Math" panose="02040503050406030204" pitchFamily="18" charset="0"/>
+                  </a:rPr>
+                  <a:t>effects</a:t>
+                </a:r>
+                <a:endParaRPr lang="en-US" dirty="0" smtClean="0"/>
+              </a:p>
+              <a:p>
+                <a:pPr marL="457200" lvl="1" indent="0">
+                  <a:buNone/>
+                </a:pPr>
+                <a14:m>
+                  <m:oMathPara xmlns:m="http://schemas.openxmlformats.org/officeDocument/2006/math">
+                    <m:oMathParaPr>
+                      <m:jc m:val="centerGroup"/>
+                    </m:oMathParaPr>
+                    <m:oMath xmlns:m="http://schemas.openxmlformats.org/officeDocument/2006/math">
+                      <m:r>
+                        <m:rPr>
+                          <m:sty m:val="p"/>
+                        </m:rPr>
+                        <a:rPr lang="en-US">
+                          <a:latin typeface="Cambria Math" panose="02040503050406030204" pitchFamily="18" charset="0"/>
+                          <a:ea typeface="Cambria Math" panose="02040503050406030204" pitchFamily="18" charset="0"/>
+                        </a:rPr>
+                        <m:t>log</m:t>
+                      </m:r>
+                      <m:r>
+                        <a:rPr lang="en-US" i="1">
+                          <a:latin typeface="Cambria Math" panose="02040503050406030204" pitchFamily="18" charset="0"/>
+                          <a:ea typeface="Cambria Math" panose="02040503050406030204" pitchFamily="18" charset="0"/>
+                        </a:rPr>
+                        <m:t>⁡</m:t>
+                      </m:r>
+                      <m:d>
+                        <m:dPr>
+                          <m:ctrlPr>
+                            <a:rPr lang="en-US" i="1">
+                              <a:latin typeface="Cambria Math" panose="02040503050406030204" pitchFamily="18" charset="0"/>
+                              <a:ea typeface="Cambria Math" panose="02040503050406030204" pitchFamily="18" charset="0"/>
+                            </a:rPr>
+                          </m:ctrlPr>
+                        </m:dPr>
+                        <m:e>
+                          <m:sSub>
+                            <m:sSubPr>
+                              <m:ctrlPr>
+                                <a:rPr lang="en-US" i="1">
+                                  <a:latin typeface="Cambria Math" panose="02040503050406030204" pitchFamily="18" charset="0"/>
+                                  <a:ea typeface="Cambria Math" panose="02040503050406030204" pitchFamily="18" charset="0"/>
+                                </a:rPr>
+                              </m:ctrlPr>
+                            </m:sSubPr>
+                            <m:e>
+                              <m:r>
+                                <a:rPr lang="en-US" b="1" i="0">
+                                  <a:latin typeface="Cambria Math" panose="02040503050406030204" pitchFamily="18" charset="0"/>
+                                  <a:ea typeface="Cambria Math" panose="02040503050406030204" pitchFamily="18" charset="0"/>
+                                </a:rPr>
+                                <m:t>𝛆</m:t>
+                              </m:r>
+                            </m:e>
+                            <m:sub>
+                              <m:r>
+                                <a:rPr lang="en-US" i="1">
+                                  <a:latin typeface="Cambria Math" panose="02040503050406030204" pitchFamily="18" charset="0"/>
+                                  <a:ea typeface="Cambria Math" panose="02040503050406030204" pitchFamily="18" charset="0"/>
+                                </a:rPr>
+                                <m:t>𝑡</m:t>
+                              </m:r>
+                            </m:sub>
+                          </m:sSub>
+                        </m:e>
+                      </m:d>
+                      <m:r>
+                        <a:rPr lang="en-US" i="1">
+                          <a:latin typeface="Cambria Math" panose="02040503050406030204" pitchFamily="18" charset="0"/>
+                          <a:ea typeface="Cambria Math" panose="02040503050406030204" pitchFamily="18" charset="0"/>
+                        </a:rPr>
+                        <m:t>~</m:t>
+                      </m:r>
+                      <m:r>
+                        <m:rPr>
+                          <m:sty m:val="p"/>
+                        </m:rPr>
+                        <a:rPr lang="en-US">
+                          <a:latin typeface="Cambria Math" panose="02040503050406030204" pitchFamily="18" charset="0"/>
+                          <a:ea typeface="Cambria Math" panose="02040503050406030204" pitchFamily="18" charset="0"/>
+                        </a:rPr>
+                        <m:t>MVN</m:t>
+                      </m:r>
+                      <m:d>
+                        <m:dPr>
+                          <m:ctrlPr>
+                            <a:rPr lang="en-US" i="1">
+                              <a:latin typeface="Cambria Math" panose="02040503050406030204" pitchFamily="18" charset="0"/>
+                              <a:ea typeface="Cambria Math" panose="02040503050406030204" pitchFamily="18" charset="0"/>
+                            </a:rPr>
+                          </m:ctrlPr>
+                        </m:dPr>
+                        <m:e>
+                          <m:r>
+                            <a:rPr lang="en-US" b="0" i="1" smtClean="0">
+                              <a:latin typeface="Cambria Math" panose="02040503050406030204" pitchFamily="18" charset="0"/>
+                              <a:ea typeface="Cambria Math" panose="02040503050406030204" pitchFamily="18" charset="0"/>
+                            </a:rPr>
+                            <m:t>0</m:t>
+                          </m:r>
+                          <m:r>
+                            <a:rPr lang="en-US" i="1">
+                              <a:latin typeface="Cambria Math" panose="02040503050406030204" pitchFamily="18" charset="0"/>
+                              <a:ea typeface="Cambria Math" panose="02040503050406030204" pitchFamily="18" charset="0"/>
+                            </a:rPr>
+                            <m:t>,</m:t>
+                          </m:r>
+                          <m:sSubSup>
+                            <m:sSubSupPr>
+                              <m:ctrlPr>
+                                <a:rPr lang="en-US" i="1">
+                                  <a:latin typeface="Cambria Math" panose="02040503050406030204" pitchFamily="18" charset="0"/>
+                                  <a:ea typeface="Cambria Math" panose="02040503050406030204" pitchFamily="18" charset="0"/>
+                                </a:rPr>
+                              </m:ctrlPr>
+                            </m:sSubSupPr>
+                            <m:e>
+                              <m:r>
+                                <a:rPr lang="en-US" i="1">
+                                  <a:latin typeface="Cambria Math" panose="02040503050406030204" pitchFamily="18" charset="0"/>
+                                  <a:ea typeface="Cambria Math" panose="02040503050406030204" pitchFamily="18" charset="0"/>
+                                </a:rPr>
+                                <m:t>𝜎</m:t>
+                              </m:r>
+                            </m:e>
+                            <m:sub>
+                              <m:r>
+                                <a:rPr lang="en-US" i="1">
+                                  <a:latin typeface="Cambria Math" panose="02040503050406030204" pitchFamily="18" charset="0"/>
+                                  <a:ea typeface="Cambria Math" panose="02040503050406030204" pitchFamily="18" charset="0"/>
+                                </a:rPr>
+                                <m:t>𝜀</m:t>
+                              </m:r>
+                            </m:sub>
+                            <m:sup>
+                              <m:r>
+                                <a:rPr lang="en-US" i="1">
+                                  <a:latin typeface="Cambria Math" panose="02040503050406030204" pitchFamily="18" charset="0"/>
+                                  <a:ea typeface="Cambria Math" panose="02040503050406030204" pitchFamily="18" charset="0"/>
+                                </a:rPr>
+                                <m:t>2</m:t>
+                              </m:r>
+                            </m:sup>
+                          </m:sSubSup>
+                          <m:sSub>
+                            <m:sSubPr>
+                              <m:ctrlPr>
+                                <a:rPr lang="en-US" i="1">
+                                  <a:latin typeface="Cambria Math" panose="02040503050406030204" pitchFamily="18" charset="0"/>
+                                  <a:ea typeface="Cambria Math" panose="02040503050406030204" pitchFamily="18" charset="0"/>
+                                </a:rPr>
+                              </m:ctrlPr>
+                            </m:sSubPr>
+                            <m:e>
+                              <m:r>
+                                <a:rPr lang="en-US" b="1">
+                                  <a:latin typeface="Cambria Math" panose="02040503050406030204" pitchFamily="18" charset="0"/>
+                                  <a:ea typeface="Cambria Math" panose="02040503050406030204" pitchFamily="18" charset="0"/>
+                                </a:rPr>
+                                <m:t>𝐑</m:t>
+                              </m:r>
+                            </m:e>
+                            <m:sub>
+                              <m:r>
+                                <a:rPr lang="en-US" i="1">
+                                  <a:latin typeface="Cambria Math" panose="02040503050406030204" pitchFamily="18" charset="0"/>
+                                  <a:ea typeface="Cambria Math" panose="02040503050406030204" pitchFamily="18" charset="0"/>
+                                </a:rPr>
+                                <m:t>𝜀</m:t>
+                              </m:r>
+                            </m:sub>
+                          </m:sSub>
+                        </m:e>
+                      </m:d>
+                    </m:oMath>
+                  </m:oMathPara>
+                </a14:m>
+                <a:endParaRPr lang="en-US" dirty="0" smtClean="0"/>
+              </a:p>
+              <a:p>
+                <a:pPr marL="457200" lvl="1" indent="0">
+                  <a:buNone/>
+                </a:pPr>
+                <a14:m>
+                  <m:oMathPara xmlns:m="http://schemas.openxmlformats.org/officeDocument/2006/math">
+                    <m:oMathParaPr>
+                      <m:jc m:val="centerGroup"/>
+                    </m:oMathParaPr>
+                    <m:oMath xmlns:m="http://schemas.openxmlformats.org/officeDocument/2006/math">
+                      <m:r>
+                        <a:rPr lang="en-US" b="1">
+                          <a:latin typeface="Cambria Math" panose="02040503050406030204" pitchFamily="18" charset="0"/>
+                          <a:ea typeface="Cambria Math" panose="02040503050406030204" pitchFamily="18" charset="0"/>
+                        </a:rPr>
+                        <m:t>𝛚</m:t>
+                      </m:r>
+                      <m:r>
+                        <a:rPr lang="en-US" i="1">
+                          <a:latin typeface="Cambria Math" panose="02040503050406030204" pitchFamily="18" charset="0"/>
+                          <a:ea typeface="Cambria Math" panose="02040503050406030204" pitchFamily="18" charset="0"/>
+                        </a:rPr>
+                        <m:t>~</m:t>
+                      </m:r>
+                      <m:r>
+                        <m:rPr>
+                          <m:sty m:val="p"/>
+                        </m:rPr>
+                        <a:rPr lang="en-US" i="0">
+                          <a:latin typeface="Cambria Math" panose="02040503050406030204" pitchFamily="18" charset="0"/>
+                          <a:ea typeface="Cambria Math" panose="02040503050406030204" pitchFamily="18" charset="0"/>
+                        </a:rPr>
+                        <m:t>MVN</m:t>
+                      </m:r>
+                      <m:d>
+                        <m:dPr>
+                          <m:ctrlPr>
+                            <a:rPr lang="en-US" i="1">
+                              <a:latin typeface="Cambria Math" panose="02040503050406030204" pitchFamily="18" charset="0"/>
+                              <a:ea typeface="Cambria Math" panose="02040503050406030204" pitchFamily="18" charset="0"/>
+                            </a:rPr>
+                          </m:ctrlPr>
+                        </m:dPr>
+                        <m:e>
+                          <m:r>
+                            <a:rPr lang="en-US" b="1" i="1" smtClean="0">
+                              <a:latin typeface="Cambria Math" panose="02040503050406030204" pitchFamily="18" charset="0"/>
+                              <a:ea typeface="Cambria Math" panose="02040503050406030204" pitchFamily="18" charset="0"/>
+                            </a:rPr>
+                            <m:t>𝟎</m:t>
+                          </m:r>
+                          <m:r>
+                            <a:rPr lang="en-US" i="1">
+                              <a:latin typeface="Cambria Math" panose="02040503050406030204" pitchFamily="18" charset="0"/>
+                              <a:ea typeface="Cambria Math" panose="02040503050406030204" pitchFamily="18" charset="0"/>
+                            </a:rPr>
+                            <m:t>,</m:t>
+                          </m:r>
+                          <m:sSubSup>
+                            <m:sSubSupPr>
+                              <m:ctrlPr>
+                                <a:rPr lang="en-US" i="1">
+                                  <a:latin typeface="Cambria Math" panose="02040503050406030204" pitchFamily="18" charset="0"/>
+                                  <a:ea typeface="Cambria Math" panose="02040503050406030204" pitchFamily="18" charset="0"/>
+                                </a:rPr>
+                              </m:ctrlPr>
+                            </m:sSubSupPr>
+                            <m:e>
+                              <m:r>
+                                <a:rPr lang="en-US" i="1">
+                                  <a:latin typeface="Cambria Math" panose="02040503050406030204" pitchFamily="18" charset="0"/>
+                                  <a:ea typeface="Cambria Math" panose="02040503050406030204" pitchFamily="18" charset="0"/>
+                                </a:rPr>
+                                <m:t>𝜎</m:t>
+                              </m:r>
+                            </m:e>
+                            <m:sub>
+                              <m:r>
+                                <a:rPr lang="en-US" i="1">
+                                  <a:latin typeface="Cambria Math" panose="02040503050406030204" pitchFamily="18" charset="0"/>
+                                  <a:ea typeface="Cambria Math" panose="02040503050406030204" pitchFamily="18" charset="0"/>
+                                </a:rPr>
+                                <m:t>𝜔</m:t>
+                              </m:r>
+                            </m:sub>
+                            <m:sup>
+                              <m:r>
+                                <a:rPr lang="en-US" i="1">
+                                  <a:latin typeface="Cambria Math" panose="02040503050406030204" pitchFamily="18" charset="0"/>
+                                  <a:ea typeface="Cambria Math" panose="02040503050406030204" pitchFamily="18" charset="0"/>
+                                </a:rPr>
+                                <m:t>2</m:t>
+                              </m:r>
+                            </m:sup>
+                          </m:sSubSup>
+                          <m:sSub>
+                            <m:sSubPr>
+                              <m:ctrlPr>
+                                <a:rPr lang="en-US" i="1">
+                                  <a:latin typeface="Cambria Math" panose="02040503050406030204" pitchFamily="18" charset="0"/>
+                                  <a:ea typeface="Cambria Math" panose="02040503050406030204" pitchFamily="18" charset="0"/>
+                                </a:rPr>
+                              </m:ctrlPr>
+                            </m:sSubPr>
+                            <m:e>
+                              <m:r>
+                                <a:rPr lang="en-US" b="1" i="0" smtClean="0">
+                                  <a:latin typeface="Cambria Math" panose="02040503050406030204" pitchFamily="18" charset="0"/>
+                                  <a:ea typeface="Cambria Math" panose="02040503050406030204" pitchFamily="18" charset="0"/>
+                                </a:rPr>
+                                <m:t>𝐑</m:t>
+                              </m:r>
+                            </m:e>
+                            <m:sub>
+                              <m:r>
+                                <a:rPr lang="en-US" i="1">
+                                  <a:latin typeface="Cambria Math" panose="02040503050406030204" pitchFamily="18" charset="0"/>
+                                  <a:ea typeface="Cambria Math" panose="02040503050406030204" pitchFamily="18" charset="0"/>
+                                </a:rPr>
+                                <m:t>𝜔</m:t>
+                              </m:r>
+                            </m:sub>
+                          </m:sSub>
+                        </m:e>
+                      </m:d>
+                    </m:oMath>
+                  </m:oMathPara>
+                </a14:m>
+                <a:endParaRPr lang="en-US" dirty="0" smtClean="0">
+                  <a:ea typeface="Cambria Math" panose="02040503050406030204" pitchFamily="18" charset="0"/>
+                </a:endParaRPr>
+              </a:p>
+              <a:p>
+                <a:pPr marL="57150" indent="0">
+                  <a:buNone/>
+                </a:pPr>
+                <a:endParaRPr lang="en-GB" dirty="0" smtClean="0"/>
+              </a:p>
+            </p:txBody>
+          </p:sp>
+        </mc:Choice>
+        <mc:Fallback>
+          <p:sp>
+            <p:nvSpPr>
+              <p:cNvPr id="3" name="Content Placeholder 2"/>
+              <p:cNvSpPr>
+                <a:spLocks noGrp="1" noRot="1" noChangeAspect="1" noMove="1" noResize="1" noEditPoints="1" noAdjustHandles="1" noChangeArrowheads="1" noChangeShapeType="1" noTextEdit="1"/>
+              </p:cNvSpPr>
+              <p:nvPr>
+                <p:ph idx="1"/>
+              </p:nvPr>
+            </p:nvSpPr>
+            <p:spPr>
+              <a:blipFill>
+                <a:blip r:embed="rId2"/>
+                <a:stretch>
+                  <a:fillRect l="-1288" t="-2154"/>
+                </a:stretch>
+              </a:blipFill>
+            </p:spPr>
+            <p:txBody>
+              <a:bodyPr/>
+              <a:lstStyle/>
+              <a:p>
+                <a:r>
+                  <a:rPr lang="en-GB">
+                    <a:noFill/>
+                  </a:rPr>
+                  <a:t> </a:t>
+                </a:r>
+              </a:p>
+            </p:txBody>
+          </p:sp>
+        </mc:Fallback>
+      </mc:AlternateContent>
+    </p:spTree>
+    <p:extLst>
+      <p:ext uri="{BB962C8B-B14F-4D97-AF65-F5344CB8AC3E}">
+        <p14:creationId xmlns:p14="http://schemas.microsoft.com/office/powerpoint/2010/main" val="1283066336"/>
+      </p:ext>
+    </p:extLst>
+  </p:cSld>
+  <p:clrMapOvr>
+    <a:masterClrMapping/>
+  </p:clrMapOvr>
+  <p:timing>
+    <p:tnLst>
+      <p:par>
+        <p:cTn id="1" dur="indefinite" restart="never" nodeType="tmRoot"/>
+      </p:par>
+    </p:tnLst>
+  </p:timing>
+</p:sld>
+</file>
+
+<file path=ppt/slides/slide14.xml><?xml version="1.0" encoding="utf-8"?>
 <p:sld xmlns:a="http://schemas.openxmlformats.org/drawingml/2006/main" xmlns:r="http://schemas.openxmlformats.org/officeDocument/2006/relationships" xmlns:p="http://schemas.openxmlformats.org/presentationml/2006/main">
   <p:cSld>
     <p:spTree>
@@ -5736,7 +8401,7 @@
         <p:spPr/>
         <p:txBody>
           <a:bodyPr>
-            <a:normAutofit fontScale="77500" lnSpcReduction="20000"/>
+            <a:normAutofit fontScale="62500" lnSpcReduction="20000"/>
           </a:bodyPr>
           <a:lstStyle/>
           <a:p>
@@ -5769,7 +8434,25 @@
             <a:pPr lvl="1" indent="-342900"/>
             <a:r>
               <a:rPr lang="en-US" dirty="0" smtClean="0"/>
-              <a:t>Only bias-correct variables you need</a:t>
+              <a:t>Only bias-correct variables you </a:t>
+            </a:r>
+            <a:r>
+              <a:rPr lang="en-US" dirty="0" smtClean="0"/>
+              <a:t>need</a:t>
+            </a:r>
+          </a:p>
+          <a:p>
+            <a:pPr lvl="1" indent="-342900"/>
+            <a:r>
+              <a:rPr lang="en-US" dirty="0" smtClean="0"/>
+              <a:t>Normalize GMRFs only when doing outer optimization (details not shown)</a:t>
+            </a:r>
+          </a:p>
+          <a:p>
+            <a:pPr lvl="1" indent="-342900"/>
+            <a:r>
+              <a:rPr lang="en-US" dirty="0" smtClean="0"/>
+              <a:t>Choose a new approximation to your dynamic process</a:t>
             </a:r>
             <a:endParaRPr lang="en-US" dirty="0" smtClean="0"/>
           </a:p>
@@ -5780,24 +8463,15 @@
             </a:pPr>
             <a:r>
               <a:rPr lang="en-US" dirty="0" smtClean="0"/>
-              <a:t>Get </a:t>
-            </a:r>
-            <a:r>
-              <a:rPr lang="en-US" dirty="0" smtClean="0"/>
-              <a:t>a bigger computer</a:t>
+              <a:t>Get a bigger computer</a:t>
             </a:r>
           </a:p>
           <a:p>
             <a:pPr lvl="1"/>
             <a:r>
               <a:rPr lang="en-US" dirty="0" smtClean="0"/>
-              <a:t>TMB allows </a:t>
+              <a:t>TMB allows parallelization</a:t>
             </a:r>
-            <a:r>
-              <a:rPr lang="en-US" dirty="0" smtClean="0"/>
-              <a:t>parallelization</a:t>
-            </a:r>
-            <a:endParaRPr lang="en-US" dirty="0" smtClean="0"/>
           </a:p>
           <a:p>
             <a:pPr marL="514350" indent="-514350">
@@ -5917,7 +8591,7 @@
                                         <p:tgtEl>
                                           <p:spTgt spid="3">
                                             <p:txEl>
-                                              <p:pRg st="4" end="4"/>
+                                              <p:pRg st="6" end="6"/>
                                             </p:txEl>
                                           </p:spTgt>
                                         </p:tgtEl>
@@ -5948,7 +8622,7 @@
                                         <p:tgtEl>
                                           <p:spTgt spid="3">
                                             <p:txEl>
-                                              <p:pRg st="5" end="5"/>
+                                              <p:pRg st="7" end="7"/>
                                             </p:txEl>
                                           </p:spTgt>
                                         </p:tgtEl>
@@ -5979,7 +8653,7 @@
                                         <p:tgtEl>
                                           <p:spTgt spid="3">
                                             <p:txEl>
-                                              <p:pRg st="6" end="6"/>
+                                              <p:pRg st="8" end="8"/>
                                             </p:txEl>
                                           </p:spTgt>
                                         </p:tgtEl>
@@ -6010,7 +8684,7 @@
                                         <p:tgtEl>
                                           <p:spTgt spid="3">
                                             <p:txEl>
-                                              <p:pRg st="7" end="7"/>
+                                              <p:pRg st="9" end="9"/>
                                             </p:txEl>
                                           </p:spTgt>
                                         </p:tgtEl>
@@ -6041,7 +8715,7 @@
                                         <p:tgtEl>
                                           <p:spTgt spid="3">
                                             <p:txEl>
-                                              <p:pRg st="8" end="8"/>
+                                              <p:pRg st="10" end="10"/>
                                             </p:txEl>
                                           </p:spTgt>
                                         </p:tgtEl>
@@ -6072,7 +8746,7 @@
                                         <p:tgtEl>
                                           <p:spTgt spid="3">
                                             <p:txEl>
-                                              <p:pRg st="9" end="9"/>
+                                              <p:pRg st="11" end="11"/>
                                             </p:txEl>
                                           </p:spTgt>
                                         </p:tgtEl>
@@ -6103,7 +8777,7 @@
                                         <p:tgtEl>
                                           <p:spTgt spid="3">
                                             <p:txEl>
-                                              <p:pRg st="10" end="10"/>
+                                              <p:pRg st="12" end="12"/>
                                             </p:txEl>
                                           </p:spTgt>
                                         </p:tgtEl>
@@ -6134,7 +8808,7 @@
                                         <p:tgtEl>
                                           <p:spTgt spid="3">
                                             <p:txEl>
-                                              <p:pRg st="11" end="11"/>
+                                              <p:pRg st="13" end="13"/>
                                             </p:txEl>
                                           </p:spTgt>
                                         </p:tgtEl>
@@ -6165,7 +8839,7 @@
                                         <p:tgtEl>
                                           <p:spTgt spid="3">
                                             <p:txEl>
-                                              <p:pRg st="12" end="12"/>
+                                              <p:pRg st="14" end="14"/>
                                             </p:txEl>
                                           </p:spTgt>
                                         </p:tgtEl>
@@ -6196,7 +8870,7 @@
                                         <p:tgtEl>
                                           <p:spTgt spid="3">
                                             <p:txEl>
-                                              <p:pRg st="13" end="13"/>
+                                              <p:pRg st="15" end="15"/>
                                             </p:txEl>
                                           </p:spTgt>
                                         </p:tgtEl>
@@ -6227,7 +8901,7 @@
                                         <p:tgtEl>
                                           <p:spTgt spid="3">
                                             <p:txEl>
-                                              <p:pRg st="14" end="14"/>
+                                              <p:pRg st="16" end="16"/>
                                             </p:txEl>
                                           </p:spTgt>
                                         </p:tgtEl>
@@ -6273,7 +8947,7 @@
 </p:sld>
 </file>
 
-<file path=ppt/slides/slide13.xml><?xml version="1.0" encoding="utf-8"?>
+<file path=ppt/slides/slide15.xml><?xml version="1.0" encoding="utf-8"?>
 <p:sld xmlns:a="http://schemas.openxmlformats.org/drawingml/2006/main" xmlns:r="http://schemas.openxmlformats.org/officeDocument/2006/relationships" xmlns:p="http://schemas.openxmlformats.org/presentationml/2006/main">
   <p:cSld>
     <p:spTree>
@@ -6331,7 +9005,6 @@
               <a:rPr lang="en-US" dirty="0" smtClean="0"/>
               <a:t>In-class exercise: </a:t>
             </a:r>
-            <a:endParaRPr lang="en-US" dirty="0" smtClean="0"/>
           </a:p>
           <a:p>
             <a:pPr marL="514350" indent="-514350">
@@ -6379,7 +9052,6 @@
               <a:rPr lang="en-US" dirty="0" smtClean="0"/>
               <a:t>Explore how estimation performance changes when increasing/decreasing the spatial resolution in the simulator</a:t>
             </a:r>
-            <a:endParaRPr lang="en-US" dirty="0" smtClean="0"/>
           </a:p>
         </p:txBody>
       </p:sp>
@@ -6439,8 +9111,8 @@
           </a:p>
         </p:txBody>
       </p:sp>
-      <mc:AlternateContent xmlns:mc="http://schemas.openxmlformats.org/markup-compatibility/2006">
-        <mc:Choice xmlns:a14="http://schemas.microsoft.com/office/drawing/2010/main" Requires="a14">
+      <mc:AlternateContent xmlns:mc="http://schemas.openxmlformats.org/markup-compatibility/2006" xmlns:a14="http://schemas.microsoft.com/office/drawing/2010/main">
+        <mc:Choice Requires="a14">
           <p:sp>
             <p:nvSpPr>
               <p:cNvPr id="3" name="Content Placeholder 2"/>
@@ -6553,7 +9225,16 @@
                                       <a:rPr lang="en-US" b="0" i="0" smtClean="0">
                                         <a:latin typeface="Cambria Math" panose="02040503050406030204" pitchFamily="18" charset="0"/>
                                       </a:rPr>
-                                      <m:t>exp</m:t>
+                                      <m:t>e</m:t>
+                                    </m:r>
+                                    <m:r>
+                                      <m:rPr>
+                                        <m:sty m:val="p"/>
+                                      </m:rPr>
+                                      <a:rPr lang="en-US" b="0" i="0" smtClean="0">
+                                        <a:latin typeface="Cambria Math" panose="02040503050406030204" pitchFamily="18" charset="0"/>
+                                      </a:rPr>
+                                      <m:t>xp</m:t>
                                     </m:r>
                                   </m:fName>
                                   <m:e>
@@ -6989,7 +9670,7 @@
             </p:txBody>
           </p:sp>
         </mc:Choice>
-        <mc:Fallback>
+        <mc:Fallback xmlns="">
           <p:sp>
             <p:nvSpPr>
               <p:cNvPr id="3" name="Content Placeholder 2"/>
@@ -7109,8 +9790,8 @@
           </a:p>
         </p:txBody>
       </p:sp>
-      <mc:AlternateContent xmlns:mc="http://schemas.openxmlformats.org/markup-compatibility/2006">
-        <mc:Choice xmlns:a14="http://schemas.microsoft.com/office/drawing/2010/main" Requires="a14">
+      <mc:AlternateContent xmlns:mc="http://schemas.openxmlformats.org/markup-compatibility/2006" xmlns:a14="http://schemas.microsoft.com/office/drawing/2010/main">
+        <mc:Choice Requires="a14">
           <p:sp>
             <p:nvSpPr>
               <p:cNvPr id="3" name="Content Placeholder 2"/>
@@ -8203,7 +10884,7 @@
             </p:txBody>
           </p:sp>
         </mc:Choice>
-        <mc:Fallback>
+        <mc:Fallback xmlns="">
           <p:sp>
             <p:nvSpPr>
               <p:cNvPr id="3" name="Content Placeholder 2"/>
@@ -9037,11 +11718,18 @@
                       <m:t>𝜌</m:t>
                     </m:r>
                     <m:r>
+                      <a:rPr lang="en-US" i="1" smtClean="0">
+                        <a:latin typeface="Cambria Math" panose="02040503050406030204" pitchFamily="18" charset="0"/>
+                        <a:ea typeface="Cambria Math" panose="02040503050406030204" pitchFamily="18" charset="0"/>
+                      </a:rPr>
+                      <m:t>→</m:t>
+                    </m:r>
+                    <m:r>
                       <a:rPr lang="en-US" i="1">
                         <a:latin typeface="Cambria Math" panose="02040503050406030204" pitchFamily="18" charset="0"/>
                         <a:ea typeface="Cambria Math" panose="02040503050406030204" pitchFamily="18" charset="0"/>
                       </a:rPr>
-                      <m:t>=1</m:t>
+                      <m:t>1</m:t>
                     </m:r>
                   </m:oMath>
                 </a14:m>
@@ -9143,8 +11831,8 @@
           </a:p>
         </p:txBody>
       </p:sp>
-      <mc:AlternateContent xmlns:mc="http://schemas.openxmlformats.org/markup-compatibility/2006">
-        <mc:Choice xmlns:a14="http://schemas.microsoft.com/office/drawing/2010/main" Requires="a14">
+      <mc:AlternateContent xmlns:mc="http://schemas.openxmlformats.org/markup-compatibility/2006" xmlns:a14="http://schemas.microsoft.com/office/drawing/2010/main">
+        <mc:Choice Requires="a14">
           <p:sp>
             <p:nvSpPr>
               <p:cNvPr id="3" name="Content Placeholder 2"/>
@@ -9203,13 +11891,7 @@
                         <a:rPr lang="en-US" b="0" i="1" smtClean="0">
                           <a:latin typeface="Cambria Math" panose="02040503050406030204" pitchFamily="18" charset="0"/>
                         </a:rPr>
-                        <m:t>)</m:t>
-                      </m:r>
-                      <m:r>
-                        <a:rPr lang="en-US" b="0" i="1" smtClean="0">
-                          <a:latin typeface="Cambria Math" panose="02040503050406030204" pitchFamily="18" charset="0"/>
-                        </a:rPr>
-                        <m:t>=</m:t>
+                        <m:t>)=</m:t>
                       </m:r>
                       <m:r>
                         <m:rPr>
@@ -9546,7 +12228,7 @@
             </p:txBody>
           </p:sp>
         </mc:Choice>
-        <mc:Fallback>
+        <mc:Fallback xmlns="">
           <p:sp>
             <p:nvSpPr>
               <p:cNvPr id="3" name="Content Placeholder 2"/>
@@ -9602,7 +12284,7 @@
           <a:graphicData uri="http://schemas.openxmlformats.org/presentationml/2006/ole">
             <mc:AlternateContent xmlns:mc="http://schemas.openxmlformats.org/markup-compatibility/2006">
               <mc:Choice xmlns:v="urn:schemas-microsoft-com:vml" Requires="v">
-                <p:oleObj spid="_x0000_s1049" name="Equation" r:id="rId4" imgW="2616120" imgH="1168200" progId="Equation.DSMT4">
+                <p:oleObj spid="_x0000_s1057" name="Equation" r:id="rId4" imgW="2616120" imgH="1168200" progId="Equation.DSMT4">
                   <p:embed/>
                 </p:oleObj>
               </mc:Choice>
@@ -9693,8 +12375,8 @@
           </a:p>
         </p:txBody>
       </p:sp>
-      <mc:AlternateContent xmlns:mc="http://schemas.openxmlformats.org/markup-compatibility/2006">
-        <mc:Choice xmlns:a14="http://schemas.microsoft.com/office/drawing/2010/main" Requires="a14">
+      <mc:AlternateContent xmlns:mc="http://schemas.openxmlformats.org/markup-compatibility/2006" xmlns:a14="http://schemas.microsoft.com/office/drawing/2010/main">
+        <mc:Choice Requires="a14">
           <p:sp>
             <p:nvSpPr>
               <p:cNvPr id="3" name="Content Placeholder 2"/>
@@ -10191,7 +12873,7 @@
                       <m:d>
                         <m:dPr>
                           <m:ctrlPr>
-                            <a:rPr lang="en-US" b="1" i="0" smtClean="0">
+                            <a:rPr lang="en-US" b="1" i="1" smtClean="0">
                               <a:latin typeface="Cambria Math" panose="02040503050406030204" pitchFamily="18" charset="0"/>
                               <a:ea typeface="Cambria Math" panose="02040503050406030204" pitchFamily="18" charset="0"/>
                             </a:rPr>
@@ -10300,7 +12982,7 @@
             </p:txBody>
           </p:sp>
         </mc:Choice>
-        <mc:Fallback>
+        <mc:Fallback xmlns="">
           <p:sp>
             <p:nvSpPr>
               <p:cNvPr id="3" name="Content Placeholder 2"/>
@@ -10390,8 +13072,8 @@
           </a:p>
         </p:txBody>
       </p:sp>
-      <mc:AlternateContent xmlns:mc="http://schemas.openxmlformats.org/markup-compatibility/2006">
-        <mc:Choice xmlns:a14="http://schemas.microsoft.com/office/drawing/2010/main" Requires="a14">
+      <mc:AlternateContent xmlns:mc="http://schemas.openxmlformats.org/markup-compatibility/2006" xmlns:a14="http://schemas.microsoft.com/office/drawing/2010/main">
+        <mc:Choice Requires="a14">
           <p:sp>
             <p:nvSpPr>
               <p:cNvPr id="3" name="Content Placeholder 2"/>
@@ -11497,15 +14179,7 @@
                 <a:pPr lvl="1"/>
                 <a:r>
                   <a:rPr lang="en-US" dirty="0" smtClean="0"/>
-                  <a:t>Very </a:t>
-                </a:r>
-                <a:r>
-                  <a:rPr lang="en-US" dirty="0" smtClean="0"/>
-                  <a:t>similar to standard Gompertz </a:t>
-                </a:r>
-                <a:r>
-                  <a:rPr lang="en-US" dirty="0" smtClean="0"/>
-                  <a:t>model</a:t>
+                  <a:t>Very similar to standard Gompertz model</a:t>
                 </a:r>
               </a:p>
               <a:p>
@@ -11535,18 +14209,13 @@
                 <a:pPr lvl="1"/>
                 <a:r>
                   <a:rPr lang="en-US" dirty="0" smtClean="0"/>
-                  <a:t>Fits to spatially referenced count </a:t>
+                  <a:t>Fits to spatially referenced count data</a:t>
                 </a:r>
-                <a:r>
-                  <a:rPr lang="en-US" dirty="0" smtClean="0"/>
-                  <a:t>data</a:t>
-                </a:r>
-                <a:endParaRPr lang="en-US" dirty="0" smtClean="0"/>
               </a:p>
             </p:txBody>
           </p:sp>
         </mc:Choice>
-        <mc:Fallback>
+        <mc:Fallback xmlns="">
           <p:sp>
             <p:nvSpPr>
               <p:cNvPr id="3" name="Content Placeholder 2"/>
@@ -12295,11 +14964,11 @@
                         </m:sSubPr>
                         <m:e>
                           <m:r>
-                            <a:rPr lang="en-US" b="1">
-                              <a:latin typeface="Cambria Math" panose="02040503050406030204" pitchFamily="18" charset="0"/>
-                              <a:ea typeface="Cambria Math" panose="02040503050406030204" pitchFamily="18" charset="0"/>
-                            </a:rPr>
-                            <m:t>𝐂</m:t>
+                            <a:rPr lang="en-US" b="1" i="0" smtClean="0">
+                              <a:latin typeface="Cambria Math" panose="02040503050406030204" pitchFamily="18" charset="0"/>
+                              <a:ea typeface="Cambria Math" panose="02040503050406030204" pitchFamily="18" charset="0"/>
+                            </a:rPr>
+                            <m:t>𝐑</m:t>
                           </m:r>
                         </m:e>
                         <m:sub>
@@ -12480,11 +15149,11 @@
                         </m:sSubPr>
                         <m:e>
                           <m:r>
-                            <a:rPr lang="en-US" b="1">
-                              <a:latin typeface="Cambria Math" panose="02040503050406030204" pitchFamily="18" charset="0"/>
-                              <a:ea typeface="Cambria Math" panose="02040503050406030204" pitchFamily="18" charset="0"/>
-                            </a:rPr>
-                            <m:t>𝐂</m:t>
+                            <a:rPr lang="en-US" b="1" i="0" smtClean="0">
+                              <a:latin typeface="Cambria Math" panose="02040503050406030204" pitchFamily="18" charset="0"/>
+                              <a:ea typeface="Cambria Math" panose="02040503050406030204" pitchFamily="18" charset="0"/>
+                            </a:rPr>
+                            <m:t>𝐑</m:t>
                           </m:r>
                         </m:e>
                         <m:sub>
@@ -13380,190 +16049,7 @@
   <p:timing>
     <p:tnLst>
       <p:par>
-        <p:cTn id="1" dur="indefinite" restart="never" nodeType="tmRoot">
-          <p:childTnLst>
-            <p:seq concurrent="1" nextAc="seek">
-              <p:cTn id="2" dur="indefinite" nodeType="mainSeq">
-                <p:childTnLst>
-                  <p:par>
-                    <p:cTn id="3" fill="hold">
-                      <p:stCondLst>
-                        <p:cond delay="indefinite"/>
-                      </p:stCondLst>
-                      <p:childTnLst>
-                        <p:par>
-                          <p:cTn id="4" fill="hold">
-                            <p:stCondLst>
-                              <p:cond delay="0"/>
-                            </p:stCondLst>
-                            <p:childTnLst>
-                              <p:par>
-                                <p:cTn id="5" presetID="1" presetClass="entr" presetSubtype="0" fill="hold" nodeType="clickEffect">
-                                  <p:stCondLst>
-                                    <p:cond delay="0"/>
-                                  </p:stCondLst>
-                                  <p:childTnLst>
-                                    <p:set>
-                                      <p:cBhvr>
-                                        <p:cTn id="6" dur="1" fill="hold">
-                                          <p:stCondLst>
-                                            <p:cond delay="0"/>
-                                          </p:stCondLst>
-                                        </p:cTn>
-                                        <p:tgtEl>
-                                          <p:spTgt spid="3">
-                                            <p:txEl>
-                                              <p:pRg st="6" end="6"/>
-                                            </p:txEl>
-                                          </p:spTgt>
-                                        </p:tgtEl>
-                                        <p:attrNameLst>
-                                          <p:attrName>style.visibility</p:attrName>
-                                        </p:attrNameLst>
-                                      </p:cBhvr>
-                                      <p:to>
-                                        <p:strVal val="visible"/>
-                                      </p:to>
-                                    </p:set>
-                                  </p:childTnLst>
-                                </p:cTn>
-                              </p:par>
-                              <p:par>
-                                <p:cTn id="7" presetID="1" presetClass="entr" presetSubtype="0" fill="hold" nodeType="withEffect">
-                                  <p:stCondLst>
-                                    <p:cond delay="0"/>
-                                  </p:stCondLst>
-                                  <p:childTnLst>
-                                    <p:set>
-                                      <p:cBhvr>
-                                        <p:cTn id="8" dur="1" fill="hold">
-                                          <p:stCondLst>
-                                            <p:cond delay="0"/>
-                                          </p:stCondLst>
-                                        </p:cTn>
-                                        <p:tgtEl>
-                                          <p:spTgt spid="3">
-                                            <p:txEl>
-                                              <p:pRg st="7" end="7"/>
-                                            </p:txEl>
-                                          </p:spTgt>
-                                        </p:tgtEl>
-                                        <p:attrNameLst>
-                                          <p:attrName>style.visibility</p:attrName>
-                                        </p:attrNameLst>
-                                      </p:cBhvr>
-                                      <p:to>
-                                        <p:strVal val="visible"/>
-                                      </p:to>
-                                    </p:set>
-                                  </p:childTnLst>
-                                </p:cTn>
-                              </p:par>
-                            </p:childTnLst>
-                          </p:cTn>
-                        </p:par>
-                      </p:childTnLst>
-                    </p:cTn>
-                  </p:par>
-                  <p:par>
-                    <p:cTn id="9" fill="hold">
-                      <p:stCondLst>
-                        <p:cond delay="indefinite"/>
-                      </p:stCondLst>
-                      <p:childTnLst>
-                        <p:par>
-                          <p:cTn id="10" fill="hold">
-                            <p:stCondLst>
-                              <p:cond delay="0"/>
-                            </p:stCondLst>
-                            <p:childTnLst>
-                              <p:par>
-                                <p:cTn id="11" presetID="1" presetClass="entr" presetSubtype="0" fill="hold" nodeType="clickEffect">
-                                  <p:stCondLst>
-                                    <p:cond delay="0"/>
-                                  </p:stCondLst>
-                                  <p:childTnLst>
-                                    <p:set>
-                                      <p:cBhvr>
-                                        <p:cTn id="12" dur="1" fill="hold">
-                                          <p:stCondLst>
-                                            <p:cond delay="0"/>
-                                          </p:stCondLst>
-                                        </p:cTn>
-                                        <p:tgtEl>
-                                          <p:spTgt spid="3">
-                                            <p:txEl>
-                                              <p:pRg st="9" end="9"/>
-                                            </p:txEl>
-                                          </p:spTgt>
-                                        </p:tgtEl>
-                                        <p:attrNameLst>
-                                          <p:attrName>style.visibility</p:attrName>
-                                        </p:attrNameLst>
-                                      </p:cBhvr>
-                                      <p:to>
-                                        <p:strVal val="visible"/>
-                                      </p:to>
-                                    </p:set>
-                                  </p:childTnLst>
-                                </p:cTn>
-                              </p:par>
-                              <p:par>
-                                <p:cTn id="13" presetID="1" presetClass="entr" presetSubtype="0" fill="hold" nodeType="withEffect">
-                                  <p:stCondLst>
-                                    <p:cond delay="0"/>
-                                  </p:stCondLst>
-                                  <p:childTnLst>
-                                    <p:set>
-                                      <p:cBhvr>
-                                        <p:cTn id="14" dur="1" fill="hold">
-                                          <p:stCondLst>
-                                            <p:cond delay="0"/>
-                                          </p:stCondLst>
-                                        </p:cTn>
-                                        <p:tgtEl>
-                                          <p:spTgt spid="3">
-                                            <p:txEl>
-                                              <p:pRg st="10" end="10"/>
-                                            </p:txEl>
-                                          </p:spTgt>
-                                        </p:tgtEl>
-                                        <p:attrNameLst>
-                                          <p:attrName>style.visibility</p:attrName>
-                                        </p:attrNameLst>
-                                      </p:cBhvr>
-                                      <p:to>
-                                        <p:strVal val="visible"/>
-                                      </p:to>
-                                    </p:set>
-                                  </p:childTnLst>
-                                </p:cTn>
-                              </p:par>
-                            </p:childTnLst>
-                          </p:cTn>
-                        </p:par>
-                      </p:childTnLst>
-                    </p:cTn>
-                  </p:par>
-                </p:childTnLst>
-              </p:cTn>
-              <p:prevCondLst>
-                <p:cond evt="onPrev" delay="0">
-                  <p:tgtEl>
-                    <p:sldTgt/>
-                  </p:tgtEl>
-                </p:cond>
-              </p:prevCondLst>
-              <p:nextCondLst>
-                <p:cond evt="onNext" delay="0">
-                  <p:tgtEl>
-                    <p:sldTgt/>
-                  </p:tgtEl>
-                </p:cond>
-              </p:nextCondLst>
-            </p:seq>
-          </p:childTnLst>
-        </p:cTn>
+        <p:cTn id="1" dur="indefinite" restart="never" nodeType="tmRoot"/>
       </p:par>
     </p:tnLst>
   </p:timing>
@@ -13606,8 +16092,8 @@
           </a:p>
         </p:txBody>
       </p:sp>
-      <mc:AlternateContent xmlns:mc="http://schemas.openxmlformats.org/markup-compatibility/2006">
-        <mc:Choice xmlns:a14="http://schemas.microsoft.com/office/drawing/2010/main" Requires="a14">
+      <mc:AlternateContent xmlns:mc="http://schemas.openxmlformats.org/markup-compatibility/2006" xmlns:a14="http://schemas.microsoft.com/office/drawing/2010/main">
+        <mc:Choice Requires="a14">
           <p:sp>
             <p:nvSpPr>
               <p:cNvPr id="3" name="Content Placeholder 2"/>
@@ -14350,7 +16836,7 @@
             </p:txBody>
           </p:sp>
         </mc:Choice>
-        <mc:Fallback>
+        <mc:Fallback xmlns="">
           <p:sp>
             <p:nvSpPr>
               <p:cNvPr id="3" name="Content Placeholder 2"/>
@@ -14384,8 +16870,8 @@
           </p:sp>
         </mc:Fallback>
       </mc:AlternateContent>
-      <mc:AlternateContent xmlns:mc="http://schemas.openxmlformats.org/markup-compatibility/2006">
-        <mc:Choice xmlns:a14="http://schemas.microsoft.com/office/drawing/2010/main" Requires="a14">
+      <mc:AlternateContent xmlns:mc="http://schemas.openxmlformats.org/markup-compatibility/2006" xmlns:a14="http://schemas.microsoft.com/office/drawing/2010/main">
+        <mc:Choice Requires="a14">
           <p:sp>
             <p:nvSpPr>
               <p:cNvPr id="4" name="Rectangle 3"/>
@@ -14407,6 +16893,7 @@
               </a:bodyPr>
               <a:lstStyle/>
               <a:p>
+                <a:pPr/>
                 <a14:m>
                   <m:oMathPara xmlns:m="http://schemas.openxmlformats.org/officeDocument/2006/math">
                     <m:oMathParaPr>
@@ -14880,7 +17367,7 @@
             </p:txBody>
           </p:sp>
         </mc:Choice>
-        <mc:Fallback>
+        <mc:Fallback xmlns="">
           <p:sp>
             <p:nvSpPr>
               <p:cNvPr id="4" name="Rectangle 3"/>

</xml_diff>